<commit_message>
Adding content to 15-4 and 15-5
</commit_message>
<xml_diff>
--- a/ROOT_Updated/websites/15_one_dof_vibrations/15_images.pptx
+++ b/ROOT_Updated/websites/15_one_dof_vibrations/15_images.pptx
@@ -27,6 +27,8 @@
     <p:sldId id="276" r:id="rId21"/>
     <p:sldId id="277" r:id="rId22"/>
     <p:sldId id="278" r:id="rId23"/>
+    <p:sldId id="279" r:id="rId24"/>
+    <p:sldId id="280" r:id="rId25"/>
   </p:sldIdLst>
   <p:sldSz cx="12192000" cy="6858000"/>
   <p:notesSz cx="6858000" cy="9144000"/>
@@ -125,6 +127,11 @@
       </a:defRPr>
     </a:lvl9pPr>
   </p:defaultTextStyle>
+  <p:extLst>
+    <p:ext uri="{EFAFB233-063F-42B5-8137-9DF3F51BA10A}">
+      <p15:sldGuideLst xmlns:p15="http://schemas.microsoft.com/office/powerpoint/2012/main"/>
+    </p:ext>
+  </p:extLst>
 </p:presentation>
 </file>
 
@@ -33105,7 +33112,7 @@
           <a:p>
             <a:fld id="{DB072751-C6EB-E540-AE6C-5B015097CD01}" type="datetimeFigureOut">
               <a:rPr lang="en-US" smtClean="0"/>
-              <a:t>6/19/19</a:t>
+              <a:t>8/1/19</a:t>
             </a:fld>
             <a:endParaRPr lang="en-US"/>
           </a:p>
@@ -33303,7 +33310,7 @@
           <a:p>
             <a:fld id="{DB072751-C6EB-E540-AE6C-5B015097CD01}" type="datetimeFigureOut">
               <a:rPr lang="en-US" smtClean="0"/>
-              <a:t>6/19/19</a:t>
+              <a:t>8/1/19</a:t>
             </a:fld>
             <a:endParaRPr lang="en-US"/>
           </a:p>
@@ -33511,7 +33518,7 @@
           <a:p>
             <a:fld id="{DB072751-C6EB-E540-AE6C-5B015097CD01}" type="datetimeFigureOut">
               <a:rPr lang="en-US" smtClean="0"/>
-              <a:t>6/19/19</a:t>
+              <a:t>8/1/19</a:t>
             </a:fld>
             <a:endParaRPr lang="en-US"/>
           </a:p>
@@ -33709,7 +33716,7 @@
           <a:p>
             <a:fld id="{DB072751-C6EB-E540-AE6C-5B015097CD01}" type="datetimeFigureOut">
               <a:rPr lang="en-US" smtClean="0"/>
-              <a:t>6/19/19</a:t>
+              <a:t>8/1/19</a:t>
             </a:fld>
             <a:endParaRPr lang="en-US"/>
           </a:p>
@@ -33984,7 +33991,7 @@
           <a:p>
             <a:fld id="{DB072751-C6EB-E540-AE6C-5B015097CD01}" type="datetimeFigureOut">
               <a:rPr lang="en-US" smtClean="0"/>
-              <a:t>6/19/19</a:t>
+              <a:t>8/1/19</a:t>
             </a:fld>
             <a:endParaRPr lang="en-US"/>
           </a:p>
@@ -34249,7 +34256,7 @@
           <a:p>
             <a:fld id="{DB072751-C6EB-E540-AE6C-5B015097CD01}" type="datetimeFigureOut">
               <a:rPr lang="en-US" smtClean="0"/>
-              <a:t>6/19/19</a:t>
+              <a:t>8/1/19</a:t>
             </a:fld>
             <a:endParaRPr lang="en-US"/>
           </a:p>
@@ -34661,7 +34668,7 @@
           <a:p>
             <a:fld id="{DB072751-C6EB-E540-AE6C-5B015097CD01}" type="datetimeFigureOut">
               <a:rPr lang="en-US" smtClean="0"/>
-              <a:t>6/19/19</a:t>
+              <a:t>8/1/19</a:t>
             </a:fld>
             <a:endParaRPr lang="en-US"/>
           </a:p>
@@ -34802,7 +34809,7 @@
           <a:p>
             <a:fld id="{DB072751-C6EB-E540-AE6C-5B015097CD01}" type="datetimeFigureOut">
               <a:rPr lang="en-US" smtClean="0"/>
-              <a:t>6/19/19</a:t>
+              <a:t>8/1/19</a:t>
             </a:fld>
             <a:endParaRPr lang="en-US"/>
           </a:p>
@@ -34915,7 +34922,7 @@
           <a:p>
             <a:fld id="{DB072751-C6EB-E540-AE6C-5B015097CD01}" type="datetimeFigureOut">
               <a:rPr lang="en-US" smtClean="0"/>
-              <a:t>6/19/19</a:t>
+              <a:t>8/1/19</a:t>
             </a:fld>
             <a:endParaRPr lang="en-US"/>
           </a:p>
@@ -35226,7 +35233,7 @@
           <a:p>
             <a:fld id="{DB072751-C6EB-E540-AE6C-5B015097CD01}" type="datetimeFigureOut">
               <a:rPr lang="en-US" smtClean="0"/>
-              <a:t>6/19/19</a:t>
+              <a:t>8/1/19</a:t>
             </a:fld>
             <a:endParaRPr lang="en-US"/>
           </a:p>
@@ -35514,7 +35521,7 @@
           <a:p>
             <a:fld id="{DB072751-C6EB-E540-AE6C-5B015097CD01}" type="datetimeFigureOut">
               <a:rPr lang="en-US" smtClean="0"/>
-              <a:t>6/19/19</a:t>
+              <a:t>8/1/19</a:t>
             </a:fld>
             <a:endParaRPr lang="en-US"/>
           </a:p>
@@ -35755,7 +35762,7 @@
           <a:p>
             <a:fld id="{DB072751-C6EB-E540-AE6C-5B015097CD01}" type="datetimeFigureOut">
               <a:rPr lang="en-US" smtClean="0"/>
-              <a:t>6/19/19</a:t>
+              <a:t>8/1/19</a:t>
             </a:fld>
             <a:endParaRPr lang="en-US"/>
           </a:p>
@@ -37018,8 +37025,8 @@
           </a:fontRef>
         </p:style>
       </p:cxnSp>
-      <mc:AlternateContent xmlns:mc="http://schemas.openxmlformats.org/markup-compatibility/2006">
-        <mc:Choice xmlns:a14="http://schemas.microsoft.com/office/drawing/2010/main" Requires="a14">
+      <mc:AlternateContent xmlns:mc="http://schemas.openxmlformats.org/markup-compatibility/2006" xmlns:a14="http://schemas.microsoft.com/office/drawing/2010/main">
+        <mc:Choice Requires="a14">
           <p:sp>
             <p:nvSpPr>
               <p:cNvPr id="11" name="TextBox 10">
@@ -37048,6 +37055,7 @@
               </a:bodyPr>
               <a:lstStyle/>
               <a:p>
+                <a:pPr/>
                 <a14:m>
                   <m:oMathPara xmlns:m="http://schemas.openxmlformats.org/officeDocument/2006/math">
                     <m:oMathParaPr>
@@ -37093,7 +37101,7 @@
             </p:txBody>
           </p:sp>
         </mc:Choice>
-        <mc:Fallback>
+        <mc:Fallback xmlns="">
           <p:sp>
             <p:nvSpPr>
               <p:cNvPr id="11" name="TextBox 10">
@@ -37138,8 +37146,8 @@
           </p:sp>
         </mc:Fallback>
       </mc:AlternateContent>
-      <mc:AlternateContent xmlns:mc="http://schemas.openxmlformats.org/markup-compatibility/2006">
-        <mc:Choice xmlns:a14="http://schemas.microsoft.com/office/drawing/2010/main" Requires="a14">
+      <mc:AlternateContent xmlns:mc="http://schemas.openxmlformats.org/markup-compatibility/2006" xmlns:a14="http://schemas.microsoft.com/office/drawing/2010/main">
+        <mc:Choice Requires="a14">
           <p:sp>
             <p:nvSpPr>
               <p:cNvPr id="12" name="TextBox 11">
@@ -37168,6 +37176,7 @@
               </a:bodyPr>
               <a:lstStyle/>
               <a:p>
+                <a:pPr/>
                 <a14:m>
                   <m:oMathPara xmlns:m="http://schemas.openxmlformats.org/officeDocument/2006/math">
                     <m:oMathParaPr>
@@ -37213,7 +37222,7 @@
             </p:txBody>
           </p:sp>
         </mc:Choice>
-        <mc:Fallback>
+        <mc:Fallback xmlns="">
           <p:sp>
             <p:nvSpPr>
               <p:cNvPr id="12" name="TextBox 11">
@@ -38429,8 +38438,8 @@
           </a:fontRef>
         </p:style>
       </p:cxnSp>
-      <mc:AlternateContent xmlns:mc="http://schemas.openxmlformats.org/markup-compatibility/2006">
-        <mc:Choice xmlns:a14="http://schemas.microsoft.com/office/drawing/2010/main" Requires="a14">
+      <mc:AlternateContent xmlns:mc="http://schemas.openxmlformats.org/markup-compatibility/2006" xmlns:a14="http://schemas.microsoft.com/office/drawing/2010/main">
+        <mc:Choice Requires="a14">
           <p:sp>
             <p:nvSpPr>
               <p:cNvPr id="28" name="TextBox 27">
@@ -38459,6 +38468,7 @@
               </a:bodyPr>
               <a:lstStyle/>
               <a:p>
+                <a:pPr/>
                 <a14:m>
                   <m:oMathPara xmlns:m="http://schemas.openxmlformats.org/officeDocument/2006/math">
                     <m:oMathParaPr>
@@ -38487,7 +38497,7 @@
             </p:txBody>
           </p:sp>
         </mc:Choice>
-        <mc:Fallback>
+        <mc:Fallback xmlns="">
           <p:sp>
             <p:nvSpPr>
               <p:cNvPr id="28" name="TextBox 27">
@@ -40222,8 +40232,8 @@
           </a:graphicData>
         </a:graphic>
       </p:graphicFrame>
-      <mc:AlternateContent xmlns:mc="http://schemas.openxmlformats.org/markup-compatibility/2006">
-        <mc:Choice xmlns:a14="http://schemas.microsoft.com/office/drawing/2010/main" Requires="a14">
+      <mc:AlternateContent xmlns:mc="http://schemas.openxmlformats.org/markup-compatibility/2006" xmlns:a14="http://schemas.microsoft.com/office/drawing/2010/main">
+        <mc:Choice Requires="a14">
           <p:sp>
             <p:nvSpPr>
               <p:cNvPr id="5" name="TextBox 4">
@@ -40252,6 +40262,7 @@
               </a:bodyPr>
               <a:lstStyle/>
               <a:p>
+                <a:pPr/>
                 <a14:m>
                   <m:oMathPara xmlns:m="http://schemas.openxmlformats.org/officeDocument/2006/math">
                     <m:oMathParaPr>
@@ -40276,7 +40287,7 @@
             </p:txBody>
           </p:sp>
         </mc:Choice>
-        <mc:Fallback>
+        <mc:Fallback xmlns="">
           <p:sp>
             <p:nvSpPr>
               <p:cNvPr id="5" name="TextBox 4">
@@ -40360,8 +40371,8 @@
           </a:p>
         </p:txBody>
       </p:sp>
-      <mc:AlternateContent xmlns:mc="http://schemas.openxmlformats.org/markup-compatibility/2006">
-        <mc:Choice xmlns:a14="http://schemas.microsoft.com/office/drawing/2010/main" Requires="a14">
+      <mc:AlternateContent xmlns:mc="http://schemas.openxmlformats.org/markup-compatibility/2006" xmlns:a14="http://schemas.microsoft.com/office/drawing/2010/main">
+        <mc:Choice Requires="a14">
           <p:sp>
             <p:nvSpPr>
               <p:cNvPr id="7" name="TextBox 6">
@@ -40390,6 +40401,7 @@
               </a:bodyPr>
               <a:lstStyle/>
               <a:p>
+                <a:pPr/>
                 <a14:m>
                   <m:oMathPara xmlns:m="http://schemas.openxmlformats.org/officeDocument/2006/math">
                     <m:oMathParaPr>
@@ -40435,7 +40447,7 @@
             </p:txBody>
           </p:sp>
         </mc:Choice>
-        <mc:Fallback>
+        <mc:Fallback xmlns="">
           <p:sp>
             <p:nvSpPr>
               <p:cNvPr id="7" name="TextBox 6">
@@ -40540,8 +40552,8 @@
           </a:graphicData>
         </a:graphic>
       </p:graphicFrame>
-      <mc:AlternateContent xmlns:mc="http://schemas.openxmlformats.org/markup-compatibility/2006">
-        <mc:Choice xmlns:a14="http://schemas.microsoft.com/office/drawing/2010/main" Requires="a14">
+      <mc:AlternateContent xmlns:mc="http://schemas.openxmlformats.org/markup-compatibility/2006" xmlns:a14="http://schemas.microsoft.com/office/drawing/2010/main">
+        <mc:Choice Requires="a14">
           <p:sp>
             <p:nvSpPr>
               <p:cNvPr id="7" name="TextBox 6">
@@ -40570,6 +40582,7 @@
               </a:bodyPr>
               <a:lstStyle/>
               <a:p>
+                <a:pPr/>
                 <a14:m>
                   <m:oMathPara xmlns:m="http://schemas.openxmlformats.org/officeDocument/2006/math">
                     <m:oMathParaPr>
@@ -40615,7 +40628,7 @@
             </p:txBody>
           </p:sp>
         </mc:Choice>
-        <mc:Fallback>
+        <mc:Fallback xmlns="">
           <p:sp>
             <p:nvSpPr>
               <p:cNvPr id="7" name="TextBox 6">
@@ -40698,8 +40711,8 @@
           </a:p>
         </p:txBody>
       </p:sp>
-      <mc:AlternateContent xmlns:mc="http://schemas.openxmlformats.org/markup-compatibility/2006">
-        <mc:Choice xmlns:a14="http://schemas.microsoft.com/office/drawing/2010/main" Requires="a14">
+      <mc:AlternateContent xmlns:mc="http://schemas.openxmlformats.org/markup-compatibility/2006" xmlns:a14="http://schemas.microsoft.com/office/drawing/2010/main">
+        <mc:Choice Requires="a14">
           <p:sp>
             <p:nvSpPr>
               <p:cNvPr id="10" name="TextBox 9">
@@ -40728,6 +40741,7 @@
               </a:bodyPr>
               <a:lstStyle/>
               <a:p>
+                <a:pPr/>
                 <a14:m>
                   <m:oMathPara xmlns:m="http://schemas.openxmlformats.org/officeDocument/2006/math">
                     <m:oMathParaPr>
@@ -40752,7 +40766,7 @@
             </p:txBody>
           </p:sp>
         </mc:Choice>
-        <mc:Fallback>
+        <mc:Fallback xmlns="">
           <p:sp>
             <p:nvSpPr>
               <p:cNvPr id="10" name="TextBox 9">
@@ -40857,8 +40871,8 @@
           </a:graphicData>
         </a:graphic>
       </p:graphicFrame>
-      <mc:AlternateContent xmlns:mc="http://schemas.openxmlformats.org/markup-compatibility/2006">
-        <mc:Choice xmlns:a14="http://schemas.microsoft.com/office/drawing/2010/main" Requires="a14">
+      <mc:AlternateContent xmlns:mc="http://schemas.openxmlformats.org/markup-compatibility/2006" xmlns:a14="http://schemas.microsoft.com/office/drawing/2010/main">
+        <mc:Choice Requires="a14">
           <p:sp>
             <p:nvSpPr>
               <p:cNvPr id="3" name="TextBox 2">
@@ -40887,6 +40901,7 @@
               </a:bodyPr>
               <a:lstStyle/>
               <a:p>
+                <a:pPr/>
                 <a14:m>
                   <m:oMathPara xmlns:m="http://schemas.openxmlformats.org/officeDocument/2006/math">
                     <m:oMathParaPr>
@@ -40911,7 +40926,7 @@
             </p:txBody>
           </p:sp>
         </mc:Choice>
-        <mc:Fallback>
+        <mc:Fallback xmlns="">
           <p:sp>
             <p:nvSpPr>
               <p:cNvPr id="3" name="TextBox 2">
@@ -40994,8 +41009,8 @@
           </a:p>
         </p:txBody>
       </p:sp>
-      <mc:AlternateContent xmlns:mc="http://schemas.openxmlformats.org/markup-compatibility/2006">
-        <mc:Choice xmlns:a14="http://schemas.microsoft.com/office/drawing/2010/main" Requires="a14">
+      <mc:AlternateContent xmlns:mc="http://schemas.openxmlformats.org/markup-compatibility/2006" xmlns:a14="http://schemas.microsoft.com/office/drawing/2010/main">
+        <mc:Choice Requires="a14">
           <p:sp>
             <p:nvSpPr>
               <p:cNvPr id="7" name="TextBox 6">
@@ -41024,6 +41039,7 @@
               </a:bodyPr>
               <a:lstStyle/>
               <a:p>
+                <a:pPr/>
                 <a14:m>
                   <m:oMathPara xmlns:m="http://schemas.openxmlformats.org/officeDocument/2006/math">
                     <m:oMathParaPr>
@@ -41069,7 +41085,7 @@
             </p:txBody>
           </p:sp>
         </mc:Choice>
-        <mc:Fallback>
+        <mc:Fallback xmlns="">
           <p:sp>
             <p:nvSpPr>
               <p:cNvPr id="7" name="TextBox 6">
@@ -41174,8 +41190,8 @@
           </a:graphicData>
         </a:graphic>
       </p:graphicFrame>
-      <mc:AlternateContent xmlns:mc="http://schemas.openxmlformats.org/markup-compatibility/2006">
-        <mc:Choice xmlns:a14="http://schemas.microsoft.com/office/drawing/2010/main" Requires="a14">
+      <mc:AlternateContent xmlns:mc="http://schemas.openxmlformats.org/markup-compatibility/2006" xmlns:a14="http://schemas.microsoft.com/office/drawing/2010/main">
+        <mc:Choice Requires="a14">
           <p:sp>
             <p:nvSpPr>
               <p:cNvPr id="3" name="TextBox 2">
@@ -41204,6 +41220,7 @@
               </a:bodyPr>
               <a:lstStyle/>
               <a:p>
+                <a:pPr/>
                 <a14:m>
                   <m:oMathPara xmlns:m="http://schemas.openxmlformats.org/officeDocument/2006/math">
                     <m:oMathParaPr>
@@ -41228,7 +41245,7 @@
             </p:txBody>
           </p:sp>
         </mc:Choice>
-        <mc:Fallback>
+        <mc:Fallback xmlns="">
           <p:sp>
             <p:nvSpPr>
               <p:cNvPr id="3" name="TextBox 2">
@@ -41311,8 +41328,8 @@
           </a:p>
         </p:txBody>
       </p:sp>
-      <mc:AlternateContent xmlns:mc="http://schemas.openxmlformats.org/markup-compatibility/2006">
-        <mc:Choice xmlns:a14="http://schemas.microsoft.com/office/drawing/2010/main" Requires="a14">
+      <mc:AlternateContent xmlns:mc="http://schemas.openxmlformats.org/markup-compatibility/2006" xmlns:a14="http://schemas.microsoft.com/office/drawing/2010/main">
+        <mc:Choice Requires="a14">
           <p:sp>
             <p:nvSpPr>
               <p:cNvPr id="5" name="TextBox 4">
@@ -41341,6 +41358,7 @@
               </a:bodyPr>
               <a:lstStyle/>
               <a:p>
+                <a:pPr/>
                 <a14:m>
                   <m:oMathPara xmlns:m="http://schemas.openxmlformats.org/officeDocument/2006/math">
                     <m:oMathParaPr>
@@ -41386,7 +41404,7 @@
             </p:txBody>
           </p:sp>
         </mc:Choice>
-        <mc:Fallback>
+        <mc:Fallback xmlns="">
           <p:sp>
             <p:nvSpPr>
               <p:cNvPr id="5" name="TextBox 4">
@@ -41491,8 +41509,8 @@
           </a:graphicData>
         </a:graphic>
       </p:graphicFrame>
-      <mc:AlternateContent xmlns:mc="http://schemas.openxmlformats.org/markup-compatibility/2006">
-        <mc:Choice xmlns:a14="http://schemas.microsoft.com/office/drawing/2010/main" Requires="a14">
+      <mc:AlternateContent xmlns:mc="http://schemas.openxmlformats.org/markup-compatibility/2006" xmlns:a14="http://schemas.microsoft.com/office/drawing/2010/main">
+        <mc:Choice Requires="a14">
           <p:sp>
             <p:nvSpPr>
               <p:cNvPr id="3" name="TextBox 2">
@@ -41521,6 +41539,7 @@
               </a:bodyPr>
               <a:lstStyle/>
               <a:p>
+                <a:pPr/>
                 <a14:m>
                   <m:oMathPara xmlns:m="http://schemas.openxmlformats.org/officeDocument/2006/math">
                     <m:oMathParaPr>
@@ -41545,7 +41564,7 @@
             </p:txBody>
           </p:sp>
         </mc:Choice>
-        <mc:Fallback>
+        <mc:Fallback xmlns="">
           <p:sp>
             <p:nvSpPr>
               <p:cNvPr id="3" name="TextBox 2">
@@ -41590,8 +41609,8 @@
           </p:sp>
         </mc:Fallback>
       </mc:AlternateContent>
-      <mc:AlternateContent xmlns:mc="http://schemas.openxmlformats.org/markup-compatibility/2006">
-        <mc:Choice xmlns:a14="http://schemas.microsoft.com/office/drawing/2010/main" Requires="a14">
+      <mc:AlternateContent xmlns:mc="http://schemas.openxmlformats.org/markup-compatibility/2006" xmlns:a14="http://schemas.microsoft.com/office/drawing/2010/main">
+        <mc:Choice Requires="a14">
           <p:sp>
             <p:nvSpPr>
               <p:cNvPr id="4" name="TextBox 3">
@@ -41620,6 +41639,7 @@
               </a:bodyPr>
               <a:lstStyle/>
               <a:p>
+                <a:pPr/>
                 <a14:m>
                   <m:oMathPara xmlns:m="http://schemas.openxmlformats.org/officeDocument/2006/math">
                     <m:oMathParaPr>
@@ -41665,7 +41685,7 @@
             </p:txBody>
           </p:sp>
         </mc:Choice>
-        <mc:Fallback>
+        <mc:Fallback xmlns="">
           <p:sp>
             <p:nvSpPr>
               <p:cNvPr id="4" name="TextBox 3">
@@ -42212,8 +42232,8 @@
           </a:graphicData>
         </a:graphic>
       </p:graphicFrame>
-      <mc:AlternateContent xmlns:mc="http://schemas.openxmlformats.org/markup-compatibility/2006">
-        <mc:Choice xmlns:a14="http://schemas.microsoft.com/office/drawing/2010/main" Requires="a14">
+      <mc:AlternateContent xmlns:mc="http://schemas.openxmlformats.org/markup-compatibility/2006" xmlns:a14="http://schemas.microsoft.com/office/drawing/2010/main">
+        <mc:Choice Requires="a14">
           <p:sp>
             <p:nvSpPr>
               <p:cNvPr id="3" name="TextBox 2">
@@ -42242,6 +42262,7 @@
               </a:bodyPr>
               <a:lstStyle/>
               <a:p>
+                <a:pPr/>
                 <a14:m>
                   <m:oMathPara xmlns:m="http://schemas.openxmlformats.org/officeDocument/2006/math">
                     <m:oMathParaPr>
@@ -42266,7 +42287,7 @@
             </p:txBody>
           </p:sp>
         </mc:Choice>
-        <mc:Fallback>
+        <mc:Fallback xmlns="">
           <p:sp>
             <p:nvSpPr>
               <p:cNvPr id="3" name="TextBox 2">
@@ -42311,8 +42332,8 @@
           </p:sp>
         </mc:Fallback>
       </mc:AlternateContent>
-      <mc:AlternateContent xmlns:mc="http://schemas.openxmlformats.org/markup-compatibility/2006">
-        <mc:Choice xmlns:a14="http://schemas.microsoft.com/office/drawing/2010/main" Requires="a14">
+      <mc:AlternateContent xmlns:mc="http://schemas.openxmlformats.org/markup-compatibility/2006" xmlns:a14="http://schemas.microsoft.com/office/drawing/2010/main">
+        <mc:Choice Requires="a14">
           <p:sp>
             <p:nvSpPr>
               <p:cNvPr id="4" name="TextBox 3">
@@ -42341,6 +42362,7 @@
               </a:bodyPr>
               <a:lstStyle/>
               <a:p>
+                <a:pPr/>
                 <a14:m>
                   <m:oMathPara xmlns:m="http://schemas.openxmlformats.org/officeDocument/2006/math">
                     <m:oMathParaPr>
@@ -42386,7 +42408,7 @@
             </p:txBody>
           </p:sp>
         </mc:Choice>
-        <mc:Fallback>
+        <mc:Fallback xmlns="">
           <p:sp>
             <p:nvSpPr>
               <p:cNvPr id="4" name="TextBox 3">
@@ -42469,8 +42491,8 @@
           </a:p>
         </p:txBody>
       </p:sp>
-      <mc:AlternateContent xmlns:mc="http://schemas.openxmlformats.org/markup-compatibility/2006">
-        <mc:Choice xmlns:a14="http://schemas.microsoft.com/office/drawing/2010/main" Requires="a14">
+      <mc:AlternateContent xmlns:mc="http://schemas.openxmlformats.org/markup-compatibility/2006" xmlns:a14="http://schemas.microsoft.com/office/drawing/2010/main">
+        <mc:Choice Requires="a14">
           <p:sp>
             <p:nvSpPr>
               <p:cNvPr id="6" name="TextBox 5">
@@ -42499,6 +42521,7 @@
               </a:bodyPr>
               <a:lstStyle/>
               <a:p>
+                <a:pPr/>
                 <a14:m>
                   <m:oMathPara xmlns:m="http://schemas.openxmlformats.org/officeDocument/2006/math">
                     <m:oMathParaPr>
@@ -42581,7 +42604,7 @@
             </p:txBody>
           </p:sp>
         </mc:Choice>
-        <mc:Fallback>
+        <mc:Fallback xmlns="">
           <p:sp>
             <p:nvSpPr>
               <p:cNvPr id="6" name="TextBox 5">
@@ -42626,8 +42649,8 @@
           </p:sp>
         </mc:Fallback>
       </mc:AlternateContent>
-      <mc:AlternateContent xmlns:mc="http://schemas.openxmlformats.org/markup-compatibility/2006">
-        <mc:Choice xmlns:a14="http://schemas.microsoft.com/office/drawing/2010/main" Requires="a14">
+      <mc:AlternateContent xmlns:mc="http://schemas.openxmlformats.org/markup-compatibility/2006" xmlns:a14="http://schemas.microsoft.com/office/drawing/2010/main">
+        <mc:Choice Requires="a14">
           <p:sp>
             <p:nvSpPr>
               <p:cNvPr id="8" name="TextBox 7">
@@ -42656,6 +42679,7 @@
               </a:bodyPr>
               <a:lstStyle/>
               <a:p>
+                <a:pPr/>
                 <a14:m>
                   <m:oMathPara xmlns:m="http://schemas.openxmlformats.org/officeDocument/2006/math">
                     <m:oMathParaPr>
@@ -42744,7 +42768,7 @@
             </p:txBody>
           </p:sp>
         </mc:Choice>
-        <mc:Fallback>
+        <mc:Fallback xmlns="">
           <p:sp>
             <p:nvSpPr>
               <p:cNvPr id="8" name="TextBox 7">
@@ -42833,8 +42857,8 @@
           </a:fontRef>
         </p:style>
       </p:cxnSp>
-      <mc:AlternateContent xmlns:mc="http://schemas.openxmlformats.org/markup-compatibility/2006">
-        <mc:Choice xmlns:a14="http://schemas.microsoft.com/office/drawing/2010/main" Requires="a14">
+      <mc:AlternateContent xmlns:mc="http://schemas.openxmlformats.org/markup-compatibility/2006" xmlns:a14="http://schemas.microsoft.com/office/drawing/2010/main">
+        <mc:Choice Requires="a14">
           <p:sp>
             <p:nvSpPr>
               <p:cNvPr id="11" name="TextBox 10">
@@ -42863,6 +42887,7 @@
               </a:bodyPr>
               <a:lstStyle/>
               <a:p>
+                <a:pPr/>
                 <a14:m>
                   <m:oMathPara xmlns:m="http://schemas.openxmlformats.org/officeDocument/2006/math">
                     <m:oMathParaPr>
@@ -42908,7 +42933,7 @@
             </p:txBody>
           </p:sp>
         </mc:Choice>
-        <mc:Fallback>
+        <mc:Fallback xmlns="">
           <p:sp>
             <p:nvSpPr>
               <p:cNvPr id="11" name="TextBox 10">
@@ -42953,8 +42978,8 @@
           </p:sp>
         </mc:Fallback>
       </mc:AlternateContent>
-      <mc:AlternateContent xmlns:mc="http://schemas.openxmlformats.org/markup-compatibility/2006">
-        <mc:Choice xmlns:a14="http://schemas.microsoft.com/office/drawing/2010/main" Requires="a14">
+      <mc:AlternateContent xmlns:mc="http://schemas.openxmlformats.org/markup-compatibility/2006" xmlns:a14="http://schemas.microsoft.com/office/drawing/2010/main">
+        <mc:Choice Requires="a14">
           <p:sp>
             <p:nvSpPr>
               <p:cNvPr id="12" name="TextBox 11">
@@ -42983,6 +43008,7 @@
               </a:bodyPr>
               <a:lstStyle/>
               <a:p>
+                <a:pPr/>
                 <a14:m>
                   <m:oMathPara xmlns:m="http://schemas.openxmlformats.org/officeDocument/2006/math">
                     <m:oMathParaPr>
@@ -43028,7 +43054,7 @@
             </p:txBody>
           </p:sp>
         </mc:Choice>
-        <mc:Fallback>
+        <mc:Fallback xmlns="">
           <p:sp>
             <p:nvSpPr>
               <p:cNvPr id="12" name="TextBox 11">
@@ -43073,8 +43099,8 @@
           </p:sp>
         </mc:Fallback>
       </mc:AlternateContent>
-      <mc:AlternateContent xmlns:mc="http://schemas.openxmlformats.org/markup-compatibility/2006">
-        <mc:Choice xmlns:a14="http://schemas.microsoft.com/office/drawing/2010/main" Requires="a14">
+      <mc:AlternateContent xmlns:mc="http://schemas.openxmlformats.org/markup-compatibility/2006" xmlns:a14="http://schemas.microsoft.com/office/drawing/2010/main">
+        <mc:Choice Requires="a14">
           <p:sp>
             <p:nvSpPr>
               <p:cNvPr id="13" name="TextBox 12">
@@ -43103,6 +43129,7 @@
               </a:bodyPr>
               <a:lstStyle/>
               <a:p>
+                <a:pPr/>
                 <a14:m>
                   <m:oMathPara xmlns:m="http://schemas.openxmlformats.org/officeDocument/2006/math">
                     <m:oMathParaPr>
@@ -43148,7 +43175,7 @@
             </p:txBody>
           </p:sp>
         </mc:Choice>
-        <mc:Fallback>
+        <mc:Fallback xmlns="">
           <p:sp>
             <p:nvSpPr>
               <p:cNvPr id="13" name="TextBox 12">
@@ -43193,8 +43220,8 @@
           </p:sp>
         </mc:Fallback>
       </mc:AlternateContent>
-      <mc:AlternateContent xmlns:mc="http://schemas.openxmlformats.org/markup-compatibility/2006">
-        <mc:Choice xmlns:a14="http://schemas.microsoft.com/office/drawing/2010/main" Requires="a14">
+      <mc:AlternateContent xmlns:mc="http://schemas.openxmlformats.org/markup-compatibility/2006" xmlns:a14="http://schemas.microsoft.com/office/drawing/2010/main">
+        <mc:Choice Requires="a14">
           <p:sp>
             <p:nvSpPr>
               <p:cNvPr id="14" name="TextBox 13">
@@ -43223,6 +43250,7 @@
               </a:bodyPr>
               <a:lstStyle/>
               <a:p>
+                <a:pPr/>
                 <a14:m>
                   <m:oMathPara xmlns:m="http://schemas.openxmlformats.org/officeDocument/2006/math">
                     <m:oMathParaPr>
@@ -43268,7 +43296,7 @@
             </p:txBody>
           </p:sp>
         </mc:Choice>
-        <mc:Fallback>
+        <mc:Fallback xmlns="">
           <p:sp>
             <p:nvSpPr>
               <p:cNvPr id="14" name="TextBox 13">
@@ -43313,8 +43341,8 @@
           </p:sp>
         </mc:Fallback>
       </mc:AlternateContent>
-      <mc:AlternateContent xmlns:mc="http://schemas.openxmlformats.org/markup-compatibility/2006">
-        <mc:Choice xmlns:a14="http://schemas.microsoft.com/office/drawing/2010/main" Requires="a14">
+      <mc:AlternateContent xmlns:mc="http://schemas.openxmlformats.org/markup-compatibility/2006" xmlns:a14="http://schemas.microsoft.com/office/drawing/2010/main">
+        <mc:Choice Requires="a14">
           <p:sp>
             <p:nvSpPr>
               <p:cNvPr id="15" name="TextBox 14">
@@ -43343,6 +43371,7 @@
               </a:bodyPr>
               <a:lstStyle/>
               <a:p>
+                <a:pPr/>
                 <a14:m>
                   <m:oMathPara xmlns:m="http://schemas.openxmlformats.org/officeDocument/2006/math">
                     <m:oMathParaPr>
@@ -43388,7 +43417,7 @@
             </p:txBody>
           </p:sp>
         </mc:Choice>
-        <mc:Fallback>
+        <mc:Fallback xmlns="">
           <p:sp>
             <p:nvSpPr>
               <p:cNvPr id="15" name="TextBox 14">
@@ -43477,8 +43506,8 @@
           </a:fontRef>
         </p:style>
       </p:cxnSp>
-      <mc:AlternateContent xmlns:mc="http://schemas.openxmlformats.org/markup-compatibility/2006">
-        <mc:Choice xmlns:a14="http://schemas.microsoft.com/office/drawing/2010/main" Requires="a14">
+      <mc:AlternateContent xmlns:mc="http://schemas.openxmlformats.org/markup-compatibility/2006" xmlns:a14="http://schemas.microsoft.com/office/drawing/2010/main">
+        <mc:Choice Requires="a14">
           <p:sp>
             <p:nvSpPr>
               <p:cNvPr id="17" name="TextBox 16">
@@ -43507,6 +43536,7 @@
               </a:bodyPr>
               <a:lstStyle/>
               <a:p>
+                <a:pPr/>
                 <a14:m>
                   <m:oMathPara xmlns:m="http://schemas.openxmlformats.org/officeDocument/2006/math">
                     <m:oMathParaPr>
@@ -43552,7 +43582,7 @@
             </p:txBody>
           </p:sp>
         </mc:Choice>
-        <mc:Fallback>
+        <mc:Fallback xmlns="">
           <p:sp>
             <p:nvSpPr>
               <p:cNvPr id="17" name="TextBox 16">
@@ -43641,8 +43671,8 @@
           </a:fontRef>
         </p:style>
       </p:cxnSp>
-      <mc:AlternateContent xmlns:mc="http://schemas.openxmlformats.org/markup-compatibility/2006">
-        <mc:Choice xmlns:a14="http://schemas.microsoft.com/office/drawing/2010/main" Requires="a14">
+      <mc:AlternateContent xmlns:mc="http://schemas.openxmlformats.org/markup-compatibility/2006" xmlns:a14="http://schemas.microsoft.com/office/drawing/2010/main">
+        <mc:Choice Requires="a14">
           <p:sp>
             <p:nvSpPr>
               <p:cNvPr id="22" name="TextBox 21">
@@ -43671,6 +43701,7 @@
               </a:bodyPr>
               <a:lstStyle/>
               <a:p>
+                <a:pPr/>
                 <a14:m>
                   <m:oMathPara xmlns:m="http://schemas.openxmlformats.org/officeDocument/2006/math">
                     <m:oMathParaPr>
@@ -43716,7 +43747,7 @@
             </p:txBody>
           </p:sp>
         </mc:Choice>
-        <mc:Fallback>
+        <mc:Fallback xmlns="">
           <p:sp>
             <p:nvSpPr>
               <p:cNvPr id="22" name="TextBox 21">
@@ -43805,8 +43836,8 @@
           </a:fontRef>
         </p:style>
       </p:cxnSp>
-      <mc:AlternateContent xmlns:mc="http://schemas.openxmlformats.org/markup-compatibility/2006">
-        <mc:Choice xmlns:a14="http://schemas.microsoft.com/office/drawing/2010/main" Requires="a14">
+      <mc:AlternateContent xmlns:mc="http://schemas.openxmlformats.org/markup-compatibility/2006" xmlns:a14="http://schemas.microsoft.com/office/drawing/2010/main">
+        <mc:Choice Requires="a14">
           <p:sp>
             <p:nvSpPr>
               <p:cNvPr id="25" name="TextBox 24">
@@ -43835,6 +43866,7 @@
               </a:bodyPr>
               <a:lstStyle/>
               <a:p>
+                <a:pPr/>
                 <a14:m>
                   <m:oMathPara xmlns:m="http://schemas.openxmlformats.org/officeDocument/2006/math">
                     <m:oMathParaPr>
@@ -43880,7 +43912,7 @@
             </p:txBody>
           </p:sp>
         </mc:Choice>
-        <mc:Fallback>
+        <mc:Fallback xmlns="">
           <p:sp>
             <p:nvSpPr>
               <p:cNvPr id="25" name="TextBox 24">
@@ -44019,8 +44051,8 @@
           </a:fontRef>
         </p:style>
       </p:cxnSp>
-      <mc:AlternateContent xmlns:mc="http://schemas.openxmlformats.org/markup-compatibility/2006">
-        <mc:Choice xmlns:a14="http://schemas.microsoft.com/office/drawing/2010/main" Requires="a14">
+      <mc:AlternateContent xmlns:mc="http://schemas.openxmlformats.org/markup-compatibility/2006" xmlns:a14="http://schemas.microsoft.com/office/drawing/2010/main">
+        <mc:Choice Requires="a14">
           <p:sp>
             <p:nvSpPr>
               <p:cNvPr id="31" name="TextBox 30">
@@ -44049,6 +44081,7 @@
               </a:bodyPr>
               <a:lstStyle/>
               <a:p>
+                <a:pPr/>
                 <a14:m>
                   <m:oMathPara xmlns:m="http://schemas.openxmlformats.org/officeDocument/2006/math">
                     <m:oMathParaPr>
@@ -44195,7 +44228,7 @@
             </p:txBody>
           </p:sp>
         </mc:Choice>
-        <mc:Fallback>
+        <mc:Fallback xmlns="">
           <p:sp>
             <p:nvSpPr>
               <p:cNvPr id="31" name="TextBox 30">
@@ -44704,8 +44737,8 @@
           </p:style>
         </p:cxnSp>
       </p:grpSp>
-      <mc:AlternateContent xmlns:mc="http://schemas.openxmlformats.org/markup-compatibility/2006">
-        <mc:Choice xmlns:a14="http://schemas.microsoft.com/office/drawing/2010/main" Requires="a14">
+      <mc:AlternateContent xmlns:mc="http://schemas.openxmlformats.org/markup-compatibility/2006" xmlns:a14="http://schemas.microsoft.com/office/drawing/2010/main">
+        <mc:Choice Requires="a14">
           <p:sp>
             <p:nvSpPr>
               <p:cNvPr id="53" name="TextBox 52">
@@ -44734,6 +44767,7 @@
               </a:bodyPr>
               <a:lstStyle/>
               <a:p>
+                <a:pPr/>
                 <a14:m>
                   <m:oMathPara xmlns:m="http://schemas.openxmlformats.org/officeDocument/2006/math">
                     <m:oMathParaPr>
@@ -44773,7 +44807,7 @@
             </p:txBody>
           </p:sp>
         </mc:Choice>
-        <mc:Fallback>
+        <mc:Fallback xmlns="">
           <p:sp>
             <p:nvSpPr>
               <p:cNvPr id="53" name="TextBox 52">
@@ -44878,8 +44912,8 @@
           </a:graphicData>
         </a:graphic>
       </p:graphicFrame>
-      <mc:AlternateContent xmlns:mc="http://schemas.openxmlformats.org/markup-compatibility/2006">
-        <mc:Choice xmlns:a14="http://schemas.microsoft.com/office/drawing/2010/main" Requires="a14">
+      <mc:AlternateContent xmlns:mc="http://schemas.openxmlformats.org/markup-compatibility/2006" xmlns:a14="http://schemas.microsoft.com/office/drawing/2010/main">
+        <mc:Choice Requires="a14">
           <p:sp>
             <p:nvSpPr>
               <p:cNvPr id="4" name="TextBox 3">
@@ -44908,6 +44942,7 @@
               </a:bodyPr>
               <a:lstStyle/>
               <a:p>
+                <a:pPr/>
                 <a14:m>
                   <m:oMathPara xmlns:m="http://schemas.openxmlformats.org/officeDocument/2006/math">
                     <m:oMathParaPr>
@@ -44932,7 +44967,7 @@
             </p:txBody>
           </p:sp>
         </mc:Choice>
-        <mc:Fallback>
+        <mc:Fallback xmlns="">
           <p:sp>
             <p:nvSpPr>
               <p:cNvPr id="4" name="TextBox 3">
@@ -45015,8 +45050,8 @@
           </a:p>
         </p:txBody>
       </p:sp>
-      <mc:AlternateContent xmlns:mc="http://schemas.openxmlformats.org/markup-compatibility/2006">
-        <mc:Choice xmlns:a14="http://schemas.microsoft.com/office/drawing/2010/main" Requires="a14">
+      <mc:AlternateContent xmlns:mc="http://schemas.openxmlformats.org/markup-compatibility/2006" xmlns:a14="http://schemas.microsoft.com/office/drawing/2010/main">
+        <mc:Choice Requires="a14">
           <p:sp>
             <p:nvSpPr>
               <p:cNvPr id="6" name="TextBox 5">
@@ -45045,6 +45080,7 @@
               </a:bodyPr>
               <a:lstStyle/>
               <a:p>
+                <a:pPr/>
                 <a14:m>
                   <m:oMathPara xmlns:m="http://schemas.openxmlformats.org/officeDocument/2006/math">
                     <m:oMathParaPr>
@@ -45090,7 +45126,7 @@
             </p:txBody>
           </p:sp>
         </mc:Choice>
-        <mc:Fallback>
+        <mc:Fallback xmlns="">
           <p:sp>
             <p:nvSpPr>
               <p:cNvPr id="6" name="TextBox 5">
@@ -45135,8 +45171,8 @@
           </p:sp>
         </mc:Fallback>
       </mc:AlternateContent>
-      <mc:AlternateContent xmlns:mc="http://schemas.openxmlformats.org/markup-compatibility/2006">
-        <mc:Choice xmlns:a14="http://schemas.microsoft.com/office/drawing/2010/main" Requires="a14">
+      <mc:AlternateContent xmlns:mc="http://schemas.openxmlformats.org/markup-compatibility/2006" xmlns:a14="http://schemas.microsoft.com/office/drawing/2010/main">
+        <mc:Choice Requires="a14">
           <p:sp>
             <p:nvSpPr>
               <p:cNvPr id="7" name="TextBox 6">
@@ -45165,6 +45201,7 @@
               </a:bodyPr>
               <a:lstStyle/>
               <a:p>
+                <a:pPr/>
                 <a14:m>
                   <m:oMathPara xmlns:m="http://schemas.openxmlformats.org/officeDocument/2006/math">
                     <m:oMathParaPr>
@@ -45196,7 +45233,7 @@
             </p:txBody>
           </p:sp>
         </mc:Choice>
-        <mc:Fallback>
+        <mc:Fallback xmlns="">
           <p:sp>
             <p:nvSpPr>
               <p:cNvPr id="7" name="TextBox 6">
@@ -45241,8 +45278,8 @@
           </p:sp>
         </mc:Fallback>
       </mc:AlternateContent>
-      <mc:AlternateContent xmlns:mc="http://schemas.openxmlformats.org/markup-compatibility/2006">
-        <mc:Choice xmlns:a14="http://schemas.microsoft.com/office/drawing/2010/main" Requires="a14">
+      <mc:AlternateContent xmlns:mc="http://schemas.openxmlformats.org/markup-compatibility/2006" xmlns:a14="http://schemas.microsoft.com/office/drawing/2010/main">
+        <mc:Choice Requires="a14">
           <p:sp>
             <p:nvSpPr>
               <p:cNvPr id="8" name="TextBox 7">
@@ -45271,6 +45308,7 @@
               </a:bodyPr>
               <a:lstStyle/>
               <a:p>
+                <a:pPr/>
                 <a14:m>
                   <m:oMathPara xmlns:m="http://schemas.openxmlformats.org/officeDocument/2006/math">
                     <m:oMathParaPr>
@@ -45295,7 +45333,7 @@
             </p:txBody>
           </p:sp>
         </mc:Choice>
-        <mc:Fallback>
+        <mc:Fallback xmlns="">
           <p:sp>
             <p:nvSpPr>
               <p:cNvPr id="8" name="TextBox 7">
@@ -45340,8 +45378,8 @@
           </p:sp>
         </mc:Fallback>
       </mc:AlternateContent>
-      <mc:AlternateContent xmlns:mc="http://schemas.openxmlformats.org/markup-compatibility/2006">
-        <mc:Choice xmlns:a14="http://schemas.microsoft.com/office/drawing/2010/main" Requires="a14">
+      <mc:AlternateContent xmlns:mc="http://schemas.openxmlformats.org/markup-compatibility/2006" xmlns:a14="http://schemas.microsoft.com/office/drawing/2010/main">
+        <mc:Choice Requires="a14">
           <p:sp>
             <p:nvSpPr>
               <p:cNvPr id="9" name="TextBox 8">
@@ -45457,7 +45495,7 @@
             </p:txBody>
           </p:sp>
         </mc:Choice>
-        <mc:Fallback>
+        <mc:Fallback xmlns="">
           <p:sp>
             <p:nvSpPr>
               <p:cNvPr id="9" name="TextBox 8">
@@ -45590,8 +45628,8 @@
           </a:fontRef>
         </p:style>
       </p:cxnSp>
-      <mc:AlternateContent xmlns:mc="http://schemas.openxmlformats.org/markup-compatibility/2006">
-        <mc:Choice xmlns:a14="http://schemas.microsoft.com/office/drawing/2010/main" Requires="a14">
+      <mc:AlternateContent xmlns:mc="http://schemas.openxmlformats.org/markup-compatibility/2006" xmlns:a14="http://schemas.microsoft.com/office/drawing/2010/main">
+        <mc:Choice Requires="a14">
           <p:sp>
             <p:nvSpPr>
               <p:cNvPr id="18" name="TextBox 17">
@@ -45620,6 +45658,7 @@
               </a:bodyPr>
               <a:lstStyle/>
               <a:p>
+                <a:pPr/>
                 <a14:m>
                   <m:oMathPara xmlns:m="http://schemas.openxmlformats.org/officeDocument/2006/math">
                     <m:oMathParaPr>
@@ -45713,7 +45752,7 @@
             </p:txBody>
           </p:sp>
         </mc:Choice>
-        <mc:Fallback>
+        <mc:Fallback xmlns="">
           <p:sp>
             <p:nvSpPr>
               <p:cNvPr id="18" name="TextBox 17">
@@ -45758,8 +45797,8 @@
           </p:sp>
         </mc:Fallback>
       </mc:AlternateContent>
-      <mc:AlternateContent xmlns:mc="http://schemas.openxmlformats.org/markup-compatibility/2006">
-        <mc:Choice xmlns:a14="http://schemas.microsoft.com/office/drawing/2010/main" Requires="a14">
+      <mc:AlternateContent xmlns:mc="http://schemas.openxmlformats.org/markup-compatibility/2006" xmlns:a14="http://schemas.microsoft.com/office/drawing/2010/main">
+        <mc:Choice Requires="a14">
           <p:sp>
             <p:nvSpPr>
               <p:cNvPr id="19" name="TextBox 18">
@@ -45788,6 +45827,7 @@
               </a:bodyPr>
               <a:lstStyle/>
               <a:p>
+                <a:pPr/>
                 <a14:m>
                   <m:oMathPara xmlns:m="http://schemas.openxmlformats.org/officeDocument/2006/math">
                     <m:oMathParaPr>
@@ -45887,7 +45927,7 @@
             </p:txBody>
           </p:sp>
         </mc:Choice>
-        <mc:Fallback>
+        <mc:Fallback xmlns="">
           <p:sp>
             <p:nvSpPr>
               <p:cNvPr id="19" name="TextBox 18">
@@ -45976,8 +46016,8 @@
           </a:fontRef>
         </p:style>
       </p:cxnSp>
-      <mc:AlternateContent xmlns:mc="http://schemas.openxmlformats.org/markup-compatibility/2006">
-        <mc:Choice xmlns:a14="http://schemas.microsoft.com/office/drawing/2010/main" Requires="a14">
+      <mc:AlternateContent xmlns:mc="http://schemas.openxmlformats.org/markup-compatibility/2006" xmlns:a14="http://schemas.microsoft.com/office/drawing/2010/main">
+        <mc:Choice Requires="a14">
           <p:sp>
             <p:nvSpPr>
               <p:cNvPr id="22" name="TextBox 21">
@@ -46006,6 +46046,7 @@
               </a:bodyPr>
               <a:lstStyle/>
               <a:p>
+                <a:pPr/>
                 <a14:m>
                   <m:oMathPara xmlns:m="http://schemas.openxmlformats.org/officeDocument/2006/math">
                     <m:oMathParaPr>
@@ -46105,7 +46146,7 @@
             </p:txBody>
           </p:sp>
         </mc:Choice>
-        <mc:Fallback>
+        <mc:Fallback xmlns="">
           <p:sp>
             <p:nvSpPr>
               <p:cNvPr id="22" name="TextBox 21">
@@ -46150,8 +46191,8 @@
           </p:sp>
         </mc:Fallback>
       </mc:AlternateContent>
-      <mc:AlternateContent xmlns:mc="http://schemas.openxmlformats.org/markup-compatibility/2006">
-        <mc:Choice xmlns:a14="http://schemas.microsoft.com/office/drawing/2010/main" Requires="a14">
+      <mc:AlternateContent xmlns:mc="http://schemas.openxmlformats.org/markup-compatibility/2006" xmlns:a14="http://schemas.microsoft.com/office/drawing/2010/main">
+        <mc:Choice Requires="a14">
           <p:sp>
             <p:nvSpPr>
               <p:cNvPr id="23" name="TextBox 22">
@@ -46180,6 +46221,7 @@
               </a:bodyPr>
               <a:lstStyle/>
               <a:p>
+                <a:pPr/>
                 <a14:m>
                   <m:oMathPara xmlns:m="http://schemas.openxmlformats.org/officeDocument/2006/math">
                     <m:oMathParaPr>
@@ -46273,7 +46315,7 @@
             </p:txBody>
           </p:sp>
         </mc:Choice>
-        <mc:Fallback>
+        <mc:Fallback xmlns="">
           <p:sp>
             <p:nvSpPr>
               <p:cNvPr id="23" name="TextBox 22">
@@ -46362,8 +46404,8 @@
           </a:fontRef>
         </p:style>
       </p:cxnSp>
-      <mc:AlternateContent xmlns:mc="http://schemas.openxmlformats.org/markup-compatibility/2006">
-        <mc:Choice xmlns:a14="http://schemas.microsoft.com/office/drawing/2010/main" Requires="a14">
+      <mc:AlternateContent xmlns:mc="http://schemas.openxmlformats.org/markup-compatibility/2006" xmlns:a14="http://schemas.microsoft.com/office/drawing/2010/main">
+        <mc:Choice Requires="a14">
           <p:sp>
             <p:nvSpPr>
               <p:cNvPr id="27" name="TextBox 26">
@@ -46506,7 +46548,7 @@
             </p:txBody>
           </p:sp>
         </mc:Choice>
-        <mc:Fallback>
+        <mc:Fallback xmlns="">
           <p:sp>
             <p:nvSpPr>
               <p:cNvPr id="27" name="TextBox 26">
@@ -46785,8 +46827,8 @@
           </p:style>
         </p:cxnSp>
       </p:grpSp>
-      <mc:AlternateContent xmlns:mc="http://schemas.openxmlformats.org/markup-compatibility/2006">
-        <mc:Choice xmlns:a14="http://schemas.microsoft.com/office/drawing/2010/main" Requires="a14">
+      <mc:AlternateContent xmlns:mc="http://schemas.openxmlformats.org/markup-compatibility/2006" xmlns:a14="http://schemas.microsoft.com/office/drawing/2010/main">
+        <mc:Choice Requires="a14">
           <p:sp>
             <p:nvSpPr>
               <p:cNvPr id="40" name="TextBox 39">
@@ -46815,6 +46857,7 @@
               </a:bodyPr>
               <a:lstStyle/>
               <a:p>
+                <a:pPr/>
                 <a14:m>
                   <m:oMathPara xmlns:m="http://schemas.openxmlformats.org/officeDocument/2006/math">
                     <m:oMathParaPr>
@@ -46854,7 +46897,7 @@
             </p:txBody>
           </p:sp>
         </mc:Choice>
-        <mc:Fallback>
+        <mc:Fallback xmlns="">
           <p:sp>
             <p:nvSpPr>
               <p:cNvPr id="40" name="TextBox 39">
@@ -46947,8 +46990,8 @@
           </a:fontRef>
         </p:style>
       </p:cxnSp>
-      <mc:AlternateContent xmlns:mc="http://schemas.openxmlformats.org/markup-compatibility/2006">
-        <mc:Choice xmlns:a14="http://schemas.microsoft.com/office/drawing/2010/main" Requires="a14">
+      <mc:AlternateContent xmlns:mc="http://schemas.openxmlformats.org/markup-compatibility/2006" xmlns:a14="http://schemas.microsoft.com/office/drawing/2010/main">
+        <mc:Choice Requires="a14">
           <p:sp>
             <p:nvSpPr>
               <p:cNvPr id="48" name="TextBox 47">
@@ -46977,6 +47020,7 @@
               </a:bodyPr>
               <a:lstStyle/>
               <a:p>
+                <a:pPr/>
                 <a14:m>
                   <m:oMathPara xmlns:m="http://schemas.openxmlformats.org/officeDocument/2006/math">
                     <m:oMathParaPr>
@@ -47220,7 +47264,7 @@
             </p:txBody>
           </p:sp>
         </mc:Choice>
-        <mc:Fallback>
+        <mc:Fallback xmlns="">
           <p:sp>
             <p:nvSpPr>
               <p:cNvPr id="48" name="TextBox 47">
@@ -47423,6 +47467,1459 @@
     <p:extLst>
       <p:ext uri="{BB962C8B-B14F-4D97-AF65-F5344CB8AC3E}">
         <p14:creationId xmlns:p14="http://schemas.microsoft.com/office/powerpoint/2010/main" val="3886482094"/>
+      </p:ext>
+    </p:extLst>
+  </p:cSld>
+  <p:clrMapOvr>
+    <a:masterClrMapping/>
+  </p:clrMapOvr>
+</p:sld>
+</file>
+
+<file path=ppt/slides/slide23.xml><?xml version="1.0" encoding="utf-8"?>
+<p:sld xmlns:a="http://schemas.openxmlformats.org/drawingml/2006/main" xmlns:r="http://schemas.openxmlformats.org/officeDocument/2006/relationships" xmlns:p="http://schemas.openxmlformats.org/presentationml/2006/main">
+  <p:cSld>
+    <p:spTree>
+      <p:nvGrpSpPr>
+        <p:cNvPr id="1" name=""/>
+        <p:cNvGrpSpPr/>
+        <p:nvPr/>
+      </p:nvGrpSpPr>
+      <p:grpSpPr>
+        <a:xfrm>
+          <a:off x="0" y="0"/>
+          <a:ext cx="0" cy="0"/>
+          <a:chOff x="0" y="0"/>
+          <a:chExt cx="0" cy="0"/>
+        </a:xfrm>
+      </p:grpSpPr>
+      <p:sp>
+        <p:nvSpPr>
+          <p:cNvPr id="5" name="Rectangle 4">
+            <a:extLst>
+              <a:ext uri="{FF2B5EF4-FFF2-40B4-BE49-F238E27FC236}">
+                <a16:creationId xmlns:a16="http://schemas.microsoft.com/office/drawing/2014/main" id="{523D8666-3C3F-F340-B973-E54232770241}"/>
+              </a:ext>
+            </a:extLst>
+          </p:cNvPr>
+          <p:cNvSpPr/>
+          <p:nvPr/>
+        </p:nvSpPr>
+        <p:spPr>
+          <a:xfrm>
+            <a:off x="0" y="1310640"/>
+            <a:ext cx="12192000" cy="5547360"/>
+          </a:xfrm>
+          <a:prstGeom prst="rect">
+            <a:avLst/>
+          </a:prstGeom>
+          <a:pattFill prst="wdDnDiag">
+            <a:fgClr>
+              <a:schemeClr val="accent3"/>
+            </a:fgClr>
+            <a:bgClr>
+              <a:schemeClr val="bg1"/>
+            </a:bgClr>
+          </a:pattFill>
+          <a:ln>
+            <a:solidFill>
+              <a:schemeClr val="bg1">
+                <a:lumMod val="75000"/>
+              </a:schemeClr>
+            </a:solidFill>
+          </a:ln>
+        </p:spPr>
+        <p:style>
+          <a:lnRef idx="2">
+            <a:schemeClr val="accent3">
+              <a:shade val="50000"/>
+            </a:schemeClr>
+          </a:lnRef>
+          <a:fillRef idx="1">
+            <a:schemeClr val="accent3"/>
+          </a:fillRef>
+          <a:effectRef idx="0">
+            <a:schemeClr val="accent3"/>
+          </a:effectRef>
+          <a:fontRef idx="minor">
+            <a:schemeClr val="lt1"/>
+          </a:fontRef>
+        </p:style>
+        <p:txBody>
+          <a:bodyPr rtlCol="0" anchor="ctr"/>
+          <a:lstStyle/>
+          <a:p>
+            <a:pPr algn="ctr"/>
+            <a:endParaRPr lang="en-US"/>
+          </a:p>
+        </p:txBody>
+      </p:sp>
+      <p:sp>
+        <p:nvSpPr>
+          <p:cNvPr id="8" name="Rectangle 7">
+            <a:extLst>
+              <a:ext uri="{FF2B5EF4-FFF2-40B4-BE49-F238E27FC236}">
+                <a16:creationId xmlns:a16="http://schemas.microsoft.com/office/drawing/2014/main" id="{AFC6364B-EF3D-4F42-9A61-8F064EA7267D}"/>
+              </a:ext>
+            </a:extLst>
+          </p:cNvPr>
+          <p:cNvSpPr/>
+          <p:nvPr/>
+        </p:nvSpPr>
+        <p:spPr>
+          <a:xfrm>
+            <a:off x="1173480" y="659474"/>
+            <a:ext cx="11209020" cy="5181600"/>
+          </a:xfrm>
+          <a:prstGeom prst="rect">
+            <a:avLst/>
+          </a:prstGeom>
+          <a:ln>
+            <a:noFill/>
+          </a:ln>
+        </p:spPr>
+        <p:style>
+          <a:lnRef idx="2">
+            <a:schemeClr val="accent6"/>
+          </a:lnRef>
+          <a:fillRef idx="1">
+            <a:schemeClr val="lt1"/>
+          </a:fillRef>
+          <a:effectRef idx="0">
+            <a:schemeClr val="accent6"/>
+          </a:effectRef>
+          <a:fontRef idx="minor">
+            <a:schemeClr val="dk1"/>
+          </a:fontRef>
+        </p:style>
+        <p:txBody>
+          <a:bodyPr rtlCol="0" anchor="ctr"/>
+          <a:lstStyle/>
+          <a:p>
+            <a:pPr algn="ctr"/>
+            <a:endParaRPr lang="en-US"/>
+          </a:p>
+        </p:txBody>
+      </p:sp>
+      <p:sp>
+        <p:nvSpPr>
+          <p:cNvPr id="6" name="Rectangle 5">
+            <a:extLst>
+              <a:ext uri="{FF2B5EF4-FFF2-40B4-BE49-F238E27FC236}">
+                <a16:creationId xmlns:a16="http://schemas.microsoft.com/office/drawing/2014/main" id="{D3E69269-CC87-E74A-B68F-E55DCB7ECD60}"/>
+              </a:ext>
+            </a:extLst>
+          </p:cNvPr>
+          <p:cNvSpPr/>
+          <p:nvPr/>
+        </p:nvSpPr>
+        <p:spPr>
+          <a:xfrm>
+            <a:off x="4849787" y="3401336"/>
+            <a:ext cx="4297680" cy="2434479"/>
+          </a:xfrm>
+          <a:prstGeom prst="rect">
+            <a:avLst/>
+          </a:prstGeom>
+          <a:solidFill>
+            <a:schemeClr val="bg1">
+              <a:lumMod val="85000"/>
+            </a:schemeClr>
+          </a:solidFill>
+          <a:ln w="38100">
+            <a:solidFill>
+              <a:schemeClr val="bg1">
+                <a:lumMod val="50000"/>
+              </a:schemeClr>
+            </a:solidFill>
+          </a:ln>
+        </p:spPr>
+        <p:style>
+          <a:lnRef idx="2">
+            <a:schemeClr val="accent3">
+              <a:shade val="50000"/>
+            </a:schemeClr>
+          </a:lnRef>
+          <a:fillRef idx="1">
+            <a:schemeClr val="accent3"/>
+          </a:fillRef>
+          <a:effectRef idx="0">
+            <a:schemeClr val="accent3"/>
+          </a:effectRef>
+          <a:fontRef idx="minor">
+            <a:schemeClr val="lt1"/>
+          </a:fontRef>
+        </p:style>
+        <p:txBody>
+          <a:bodyPr rtlCol="0" anchor="ctr"/>
+          <a:lstStyle/>
+          <a:p>
+            <a:pPr algn="ctr"/>
+            <a:r>
+              <a:rPr lang="en-US" sz="6000" i="1" dirty="0">
+                <a:solidFill>
+                  <a:schemeClr val="tx1"/>
+                </a:solidFill>
+                <a:latin typeface="Times New Roman" panose="02020603050405020304" pitchFamily="18" charset="0"/>
+                <a:cs typeface="Times New Roman" panose="02020603050405020304" pitchFamily="18" charset="0"/>
+              </a:rPr>
+              <a:t>m</a:t>
+            </a:r>
+          </a:p>
+        </p:txBody>
+      </p:sp>
+      <p:pic>
+        <p:nvPicPr>
+          <p:cNvPr id="9" name="Picture 8">
+            <a:extLst>
+              <a:ext uri="{FF2B5EF4-FFF2-40B4-BE49-F238E27FC236}">
+                <a16:creationId xmlns:a16="http://schemas.microsoft.com/office/drawing/2014/main" id="{547FDF70-C332-FF44-9E84-63DA969BAE52}"/>
+              </a:ext>
+            </a:extLst>
+          </p:cNvPr>
+          <p:cNvPicPr/>
+          <p:nvPr/>
+        </p:nvPicPr>
+        <p:blipFill rotWithShape="1">
+          <a:blip r:embed="rId2">
+            <a:extLst>
+              <a:ext uri="{BEBA8EAE-BF5A-486C-A8C5-ECC9F3942E4B}">
+                <a14:imgProps xmlns:a14="http://schemas.microsoft.com/office/drawing/2010/main">
+                  <a14:imgLayer r:embed="rId3">
+                    <a14:imgEffect>
+                      <a14:backgroundRemoval t="10000" b="90000" l="4750" r="96750"/>
+                    </a14:imgEffect>
+                  </a14:imgLayer>
+                </a14:imgProps>
+              </a:ext>
+              <a:ext uri="{28A0092B-C50C-407E-A947-70E740481C1C}">
+                <a14:useLocalDpi xmlns:a14="http://schemas.microsoft.com/office/drawing/2010/main" val="0"/>
+              </a:ext>
+            </a:extLst>
+          </a:blip>
+          <a:srcRect l="4622" r="4554"/>
+          <a:stretch/>
+        </p:blipFill>
+        <p:spPr bwMode="auto">
+          <a:xfrm>
+            <a:off x="1173480" y="4683332"/>
+            <a:ext cx="3676307" cy="856369"/>
+          </a:xfrm>
+          <a:prstGeom prst="rect">
+            <a:avLst/>
+          </a:prstGeom>
+          <a:noFill/>
+          <a:ln>
+            <a:noFill/>
+          </a:ln>
+        </p:spPr>
+      </p:pic>
+      <p:sp>
+        <p:nvSpPr>
+          <p:cNvPr id="11" name="TextBox 10">
+            <a:extLst>
+              <a:ext uri="{FF2B5EF4-FFF2-40B4-BE49-F238E27FC236}">
+                <a16:creationId xmlns:a16="http://schemas.microsoft.com/office/drawing/2014/main" id="{345B28EC-84B4-0144-951D-D1EC2BE6FC84}"/>
+              </a:ext>
+            </a:extLst>
+          </p:cNvPr>
+          <p:cNvSpPr txBox="1"/>
+          <p:nvPr/>
+        </p:nvSpPr>
+        <p:spPr>
+          <a:xfrm>
+            <a:off x="3873583" y="4176148"/>
+            <a:ext cx="526106" cy="1015663"/>
+          </a:xfrm>
+          <a:prstGeom prst="rect">
+            <a:avLst/>
+          </a:prstGeom>
+          <a:noFill/>
+        </p:spPr>
+        <p:txBody>
+          <a:bodyPr wrap="none" rtlCol="0">
+            <a:spAutoFit/>
+          </a:bodyPr>
+          <a:lstStyle/>
+          <a:p>
+            <a:r>
+              <a:rPr lang="en-US" sz="6000" i="1" dirty="0">
+                <a:latin typeface="Times New Roman" panose="02020603050405020304" pitchFamily="18" charset="0"/>
+                <a:cs typeface="Times New Roman" panose="02020603050405020304" pitchFamily="18" charset="0"/>
+              </a:rPr>
+              <a:t>k</a:t>
+            </a:r>
+          </a:p>
+        </p:txBody>
+      </p:sp>
+      <p:cxnSp>
+        <p:nvCxnSpPr>
+          <p:cNvPr id="13" name="Straight Connector 12">
+            <a:extLst>
+              <a:ext uri="{FF2B5EF4-FFF2-40B4-BE49-F238E27FC236}">
+                <a16:creationId xmlns:a16="http://schemas.microsoft.com/office/drawing/2014/main" id="{F3096D38-7AD8-0841-B0F8-27FB46B4CDCC}"/>
+              </a:ext>
+            </a:extLst>
+          </p:cNvPr>
+          <p:cNvCxnSpPr/>
+          <p:nvPr/>
+        </p:nvCxnSpPr>
+        <p:spPr>
+          <a:xfrm>
+            <a:off x="4849787" y="1397934"/>
+            <a:ext cx="0" cy="1702861"/>
+          </a:xfrm>
+          <a:prstGeom prst="line">
+            <a:avLst/>
+          </a:prstGeom>
+          <a:ln w="28575"/>
+        </p:spPr>
+        <p:style>
+          <a:lnRef idx="1">
+            <a:schemeClr val="dk1"/>
+          </a:lnRef>
+          <a:fillRef idx="0">
+            <a:schemeClr val="dk1"/>
+          </a:fillRef>
+          <a:effectRef idx="0">
+            <a:schemeClr val="dk1"/>
+          </a:effectRef>
+          <a:fontRef idx="minor">
+            <a:schemeClr val="tx1"/>
+          </a:fontRef>
+        </p:style>
+      </p:cxnSp>
+      <p:cxnSp>
+        <p:nvCxnSpPr>
+          <p:cNvPr id="15" name="Straight Arrow Connector 14">
+            <a:extLst>
+              <a:ext uri="{FF2B5EF4-FFF2-40B4-BE49-F238E27FC236}">
+                <a16:creationId xmlns:a16="http://schemas.microsoft.com/office/drawing/2014/main" id="{DCDEA662-F38C-B740-9BFB-E11210ACF556}"/>
+              </a:ext>
+            </a:extLst>
+          </p:cNvPr>
+          <p:cNvCxnSpPr/>
+          <p:nvPr/>
+        </p:nvCxnSpPr>
+        <p:spPr>
+          <a:xfrm>
+            <a:off x="4849787" y="2227741"/>
+            <a:ext cx="2148840" cy="0"/>
+          </a:xfrm>
+          <a:prstGeom prst="straightConnector1">
+            <a:avLst/>
+          </a:prstGeom>
+          <a:ln w="28575">
+            <a:tailEnd type="triangle" w="lg" len="lg"/>
+          </a:ln>
+        </p:spPr>
+        <p:style>
+          <a:lnRef idx="1">
+            <a:schemeClr val="dk1"/>
+          </a:lnRef>
+          <a:fillRef idx="0">
+            <a:schemeClr val="dk1"/>
+          </a:fillRef>
+          <a:effectRef idx="0">
+            <a:schemeClr val="dk1"/>
+          </a:effectRef>
+          <a:fontRef idx="minor">
+            <a:schemeClr val="tx1"/>
+          </a:fontRef>
+        </p:style>
+      </p:cxnSp>
+      <p:sp>
+        <p:nvSpPr>
+          <p:cNvPr id="16" name="TextBox 15">
+            <a:extLst>
+              <a:ext uri="{FF2B5EF4-FFF2-40B4-BE49-F238E27FC236}">
+                <a16:creationId xmlns:a16="http://schemas.microsoft.com/office/drawing/2014/main" id="{A096C57D-7003-0E45-89F6-0758B5E07156}"/>
+              </a:ext>
+            </a:extLst>
+          </p:cNvPr>
+          <p:cNvSpPr txBox="1"/>
+          <p:nvPr/>
+        </p:nvSpPr>
+        <p:spPr>
+          <a:xfrm>
+            <a:off x="5661154" y="1140774"/>
+            <a:ext cx="526106" cy="1015663"/>
+          </a:xfrm>
+          <a:prstGeom prst="rect">
+            <a:avLst/>
+          </a:prstGeom>
+          <a:noFill/>
+        </p:spPr>
+        <p:txBody>
+          <a:bodyPr wrap="none" rtlCol="0">
+            <a:spAutoFit/>
+          </a:bodyPr>
+          <a:lstStyle/>
+          <a:p>
+            <a:r>
+              <a:rPr lang="en-US" sz="6000" i="1" dirty="0">
+                <a:latin typeface="Times New Roman" panose="02020603050405020304" pitchFamily="18" charset="0"/>
+                <a:cs typeface="Times New Roman" panose="02020603050405020304" pitchFamily="18" charset="0"/>
+              </a:rPr>
+              <a:t>x</a:t>
+            </a:r>
+          </a:p>
+        </p:txBody>
+      </p:sp>
+      <p:cxnSp>
+        <p:nvCxnSpPr>
+          <p:cNvPr id="17" name="Straight Arrow Connector 16">
+            <a:extLst>
+              <a:ext uri="{FF2B5EF4-FFF2-40B4-BE49-F238E27FC236}">
+                <a16:creationId xmlns:a16="http://schemas.microsoft.com/office/drawing/2014/main" id="{1AEFBAD7-8963-1642-B72E-277D4C26D88E}"/>
+              </a:ext>
+            </a:extLst>
+          </p:cNvPr>
+          <p:cNvCxnSpPr>
+            <a:cxnSpLocks/>
+          </p:cNvCxnSpPr>
+          <p:nvPr/>
+        </p:nvCxnSpPr>
+        <p:spPr>
+          <a:xfrm>
+            <a:off x="1173480" y="2225040"/>
+            <a:ext cx="3676307" cy="0"/>
+          </a:xfrm>
+          <a:prstGeom prst="straightConnector1">
+            <a:avLst/>
+          </a:prstGeom>
+          <a:ln w="28575">
+            <a:headEnd type="triangle" w="lg" len="lg"/>
+            <a:tailEnd type="triangle" w="lg" len="lg"/>
+          </a:ln>
+        </p:spPr>
+        <p:style>
+          <a:lnRef idx="1">
+            <a:schemeClr val="dk1"/>
+          </a:lnRef>
+          <a:fillRef idx="0">
+            <a:schemeClr val="dk1"/>
+          </a:fillRef>
+          <a:effectRef idx="0">
+            <a:schemeClr val="dk1"/>
+          </a:effectRef>
+          <a:fontRef idx="minor">
+            <a:schemeClr val="tx1"/>
+          </a:fontRef>
+        </p:style>
+      </p:cxnSp>
+      <p:sp>
+        <p:nvSpPr>
+          <p:cNvPr id="19" name="TextBox 18">
+            <a:extLst>
+              <a:ext uri="{FF2B5EF4-FFF2-40B4-BE49-F238E27FC236}">
+                <a16:creationId xmlns:a16="http://schemas.microsoft.com/office/drawing/2014/main" id="{08BD4514-0631-2849-93C9-97BEFDBB3CAB}"/>
+              </a:ext>
+            </a:extLst>
+          </p:cNvPr>
+          <p:cNvSpPr txBox="1"/>
+          <p:nvPr/>
+        </p:nvSpPr>
+        <p:spPr>
+          <a:xfrm>
+            <a:off x="2639861" y="1048745"/>
+            <a:ext cx="1010213" cy="1015663"/>
+          </a:xfrm>
+          <a:prstGeom prst="rect">
+            <a:avLst/>
+          </a:prstGeom>
+          <a:noFill/>
+        </p:spPr>
+        <p:txBody>
+          <a:bodyPr wrap="none" rtlCol="0">
+            <a:spAutoFit/>
+          </a:bodyPr>
+          <a:lstStyle/>
+          <a:p>
+            <a:r>
+              <a:rPr lang="en-US" sz="6000" i="1" dirty="0" err="1">
+                <a:latin typeface="Times New Roman" panose="02020603050405020304" pitchFamily="18" charset="0"/>
+                <a:cs typeface="Times New Roman" panose="02020603050405020304" pitchFamily="18" charset="0"/>
+              </a:rPr>
+              <a:t>x</a:t>
+            </a:r>
+            <a:r>
+              <a:rPr lang="en-US" sz="6000" i="1" baseline="-25000" dirty="0" err="1">
+                <a:latin typeface="Times New Roman" panose="02020603050405020304" pitchFamily="18" charset="0"/>
+                <a:cs typeface="Times New Roman" panose="02020603050405020304" pitchFamily="18" charset="0"/>
+              </a:rPr>
+              <a:t>eq</a:t>
+            </a:r>
+            <a:endParaRPr lang="en-US" sz="6000" i="1" baseline="-25000" dirty="0">
+              <a:latin typeface="Times New Roman" panose="02020603050405020304" pitchFamily="18" charset="0"/>
+              <a:cs typeface="Times New Roman" panose="02020603050405020304" pitchFamily="18" charset="0"/>
+            </a:endParaRPr>
+          </a:p>
+        </p:txBody>
+      </p:sp>
+      <p:sp>
+        <p:nvSpPr>
+          <p:cNvPr id="20" name="TextBox 19">
+            <a:extLst>
+              <a:ext uri="{FF2B5EF4-FFF2-40B4-BE49-F238E27FC236}">
+                <a16:creationId xmlns:a16="http://schemas.microsoft.com/office/drawing/2014/main" id="{DD5E0161-A828-1B43-9EC2-E4CBBE1C8B0A}"/>
+              </a:ext>
+            </a:extLst>
+          </p:cNvPr>
+          <p:cNvSpPr txBox="1"/>
+          <p:nvPr/>
+        </p:nvSpPr>
+        <p:spPr>
+          <a:xfrm>
+            <a:off x="9956568" y="3517979"/>
+            <a:ext cx="654346" cy="1015663"/>
+          </a:xfrm>
+          <a:prstGeom prst="rect">
+            <a:avLst/>
+          </a:prstGeom>
+          <a:noFill/>
+        </p:spPr>
+        <p:txBody>
+          <a:bodyPr wrap="none" rtlCol="0">
+            <a:spAutoFit/>
+          </a:bodyPr>
+          <a:lstStyle/>
+          <a:p>
+            <a:r>
+              <a:rPr lang="en-US" sz="6000" i="1" dirty="0">
+                <a:latin typeface="Times New Roman" panose="02020603050405020304" pitchFamily="18" charset="0"/>
+                <a:cs typeface="Times New Roman" panose="02020603050405020304" pitchFamily="18" charset="0"/>
+              </a:rPr>
+              <a:t>F</a:t>
+            </a:r>
+            <a:endParaRPr lang="en-US" sz="6000" dirty="0">
+              <a:latin typeface="Times New Roman" panose="02020603050405020304" pitchFamily="18" charset="0"/>
+              <a:cs typeface="Times New Roman" panose="02020603050405020304" pitchFamily="18" charset="0"/>
+            </a:endParaRPr>
+          </a:p>
+        </p:txBody>
+      </p:sp>
+      <p:grpSp>
+        <p:nvGrpSpPr>
+          <p:cNvPr id="14" name="Group 13">
+            <a:extLst>
+              <a:ext uri="{FF2B5EF4-FFF2-40B4-BE49-F238E27FC236}">
+                <a16:creationId xmlns:a16="http://schemas.microsoft.com/office/drawing/2014/main" id="{6DB5472C-1D37-B64D-B5F0-A71D984FA2C3}"/>
+              </a:ext>
+            </a:extLst>
+          </p:cNvPr>
+          <p:cNvGrpSpPr/>
+          <p:nvPr/>
+        </p:nvGrpSpPr>
+        <p:grpSpPr>
+          <a:xfrm rot="16200000">
+            <a:off x="2489960" y="2055481"/>
+            <a:ext cx="1043352" cy="3676312"/>
+            <a:chOff x="4067309" y="2103552"/>
+            <a:chExt cx="508387" cy="1816018"/>
+          </a:xfrm>
+        </p:grpSpPr>
+        <p:cxnSp>
+          <p:nvCxnSpPr>
+            <p:cNvPr id="18" name="Straight Connector 17">
+              <a:extLst>
+                <a:ext uri="{FF2B5EF4-FFF2-40B4-BE49-F238E27FC236}">
+                  <a16:creationId xmlns:a16="http://schemas.microsoft.com/office/drawing/2014/main" id="{87B55E72-4E1B-4C40-836F-653D73E711B0}"/>
+                </a:ext>
+              </a:extLst>
+            </p:cNvPr>
+            <p:cNvCxnSpPr>
+              <a:cxnSpLocks/>
+            </p:cNvCxnSpPr>
+            <p:nvPr/>
+          </p:nvCxnSpPr>
+          <p:spPr>
+            <a:xfrm>
+              <a:off x="4319416" y="2103552"/>
+              <a:ext cx="0" cy="712731"/>
+            </a:xfrm>
+            <a:prstGeom prst="line">
+              <a:avLst/>
+            </a:prstGeom>
+            <a:ln w="38100"/>
+          </p:spPr>
+          <p:style>
+            <a:lnRef idx="3">
+              <a:schemeClr val="dk1"/>
+            </a:lnRef>
+            <a:fillRef idx="0">
+              <a:schemeClr val="dk1"/>
+            </a:fillRef>
+            <a:effectRef idx="2">
+              <a:schemeClr val="dk1"/>
+            </a:effectRef>
+            <a:fontRef idx="minor">
+              <a:schemeClr val="tx1"/>
+            </a:fontRef>
+          </p:style>
+        </p:cxnSp>
+        <p:cxnSp>
+          <p:nvCxnSpPr>
+            <p:cNvPr id="21" name="Straight Connector 20">
+              <a:extLst>
+                <a:ext uri="{FF2B5EF4-FFF2-40B4-BE49-F238E27FC236}">
+                  <a16:creationId xmlns:a16="http://schemas.microsoft.com/office/drawing/2014/main" id="{2E038339-0E90-B045-93C3-D87F9B2D2699}"/>
+                </a:ext>
+              </a:extLst>
+            </p:cNvPr>
+            <p:cNvCxnSpPr>
+              <a:cxnSpLocks/>
+            </p:cNvCxnSpPr>
+            <p:nvPr/>
+          </p:nvCxnSpPr>
+          <p:spPr>
+            <a:xfrm flipH="1">
+              <a:off x="4319737" y="2984498"/>
+              <a:ext cx="1163" cy="935072"/>
+            </a:xfrm>
+            <a:prstGeom prst="line">
+              <a:avLst/>
+            </a:prstGeom>
+            <a:ln w="38100"/>
+          </p:spPr>
+          <p:style>
+            <a:lnRef idx="3">
+              <a:schemeClr val="dk1"/>
+            </a:lnRef>
+            <a:fillRef idx="0">
+              <a:schemeClr val="dk1"/>
+            </a:fillRef>
+            <a:effectRef idx="2">
+              <a:schemeClr val="dk1"/>
+            </a:effectRef>
+            <a:fontRef idx="minor">
+              <a:schemeClr val="tx1"/>
+            </a:fontRef>
+          </p:style>
+        </p:cxnSp>
+        <p:cxnSp>
+          <p:nvCxnSpPr>
+            <p:cNvPr id="22" name="Straight Connector 21">
+              <a:extLst>
+                <a:ext uri="{FF2B5EF4-FFF2-40B4-BE49-F238E27FC236}">
+                  <a16:creationId xmlns:a16="http://schemas.microsoft.com/office/drawing/2014/main" id="{46FB5262-4DAB-BA48-97CF-67C11C2CB986}"/>
+                </a:ext>
+              </a:extLst>
+            </p:cNvPr>
+            <p:cNvCxnSpPr>
+              <a:cxnSpLocks/>
+            </p:cNvCxnSpPr>
+            <p:nvPr/>
+          </p:nvCxnSpPr>
+          <p:spPr>
+            <a:xfrm>
+              <a:off x="4067309" y="2628133"/>
+              <a:ext cx="0" cy="356365"/>
+            </a:xfrm>
+            <a:prstGeom prst="line">
+              <a:avLst/>
+            </a:prstGeom>
+            <a:ln w="38100"/>
+          </p:spPr>
+          <p:style>
+            <a:lnRef idx="3">
+              <a:schemeClr val="dk1"/>
+            </a:lnRef>
+            <a:fillRef idx="0">
+              <a:schemeClr val="dk1"/>
+            </a:fillRef>
+            <a:effectRef idx="2">
+              <a:schemeClr val="dk1"/>
+            </a:effectRef>
+            <a:fontRef idx="minor">
+              <a:schemeClr val="tx1"/>
+            </a:fontRef>
+          </p:style>
+        </p:cxnSp>
+        <p:cxnSp>
+          <p:nvCxnSpPr>
+            <p:cNvPr id="23" name="Straight Connector 22">
+              <a:extLst>
+                <a:ext uri="{FF2B5EF4-FFF2-40B4-BE49-F238E27FC236}">
+                  <a16:creationId xmlns:a16="http://schemas.microsoft.com/office/drawing/2014/main" id="{69DBEBC0-121D-744D-85DA-BC24809A9FD0}"/>
+                </a:ext>
+              </a:extLst>
+            </p:cNvPr>
+            <p:cNvCxnSpPr>
+              <a:cxnSpLocks/>
+            </p:cNvCxnSpPr>
+            <p:nvPr/>
+          </p:nvCxnSpPr>
+          <p:spPr>
+            <a:xfrm>
+              <a:off x="4575696" y="2628133"/>
+              <a:ext cx="0" cy="356365"/>
+            </a:xfrm>
+            <a:prstGeom prst="line">
+              <a:avLst/>
+            </a:prstGeom>
+            <a:ln w="38100"/>
+          </p:spPr>
+          <p:style>
+            <a:lnRef idx="3">
+              <a:schemeClr val="dk1"/>
+            </a:lnRef>
+            <a:fillRef idx="0">
+              <a:schemeClr val="dk1"/>
+            </a:fillRef>
+            <a:effectRef idx="2">
+              <a:schemeClr val="dk1"/>
+            </a:effectRef>
+            <a:fontRef idx="minor">
+              <a:schemeClr val="tx1"/>
+            </a:fontRef>
+          </p:style>
+        </p:cxnSp>
+        <p:cxnSp>
+          <p:nvCxnSpPr>
+            <p:cNvPr id="24" name="Straight Connector 23">
+              <a:extLst>
+                <a:ext uri="{FF2B5EF4-FFF2-40B4-BE49-F238E27FC236}">
+                  <a16:creationId xmlns:a16="http://schemas.microsoft.com/office/drawing/2014/main" id="{FF01EB9A-2DDF-FB4D-9925-EBCE33139CB3}"/>
+                </a:ext>
+              </a:extLst>
+            </p:cNvPr>
+            <p:cNvCxnSpPr>
+              <a:cxnSpLocks/>
+            </p:cNvCxnSpPr>
+            <p:nvPr/>
+          </p:nvCxnSpPr>
+          <p:spPr>
+            <a:xfrm>
+              <a:off x="4067309" y="2984498"/>
+              <a:ext cx="508387" cy="0"/>
+            </a:xfrm>
+            <a:prstGeom prst="line">
+              <a:avLst/>
+            </a:prstGeom>
+            <a:ln w="38100"/>
+          </p:spPr>
+          <p:style>
+            <a:lnRef idx="3">
+              <a:schemeClr val="dk1"/>
+            </a:lnRef>
+            <a:fillRef idx="0">
+              <a:schemeClr val="dk1"/>
+            </a:fillRef>
+            <a:effectRef idx="2">
+              <a:schemeClr val="dk1"/>
+            </a:effectRef>
+            <a:fontRef idx="minor">
+              <a:schemeClr val="tx1"/>
+            </a:fontRef>
+          </p:style>
+        </p:cxnSp>
+        <p:cxnSp>
+          <p:nvCxnSpPr>
+            <p:cNvPr id="25" name="Straight Connector 24">
+              <a:extLst>
+                <a:ext uri="{FF2B5EF4-FFF2-40B4-BE49-F238E27FC236}">
+                  <a16:creationId xmlns:a16="http://schemas.microsoft.com/office/drawing/2014/main" id="{C9692A9F-F4A9-D641-A70E-D49020818E70}"/>
+                </a:ext>
+              </a:extLst>
+            </p:cNvPr>
+            <p:cNvCxnSpPr>
+              <a:cxnSpLocks/>
+            </p:cNvCxnSpPr>
+            <p:nvPr/>
+          </p:nvCxnSpPr>
+          <p:spPr>
+            <a:xfrm>
+              <a:off x="4129892" y="2816283"/>
+              <a:ext cx="379048" cy="0"/>
+            </a:xfrm>
+            <a:prstGeom prst="line">
+              <a:avLst/>
+            </a:prstGeom>
+            <a:ln w="38100"/>
+          </p:spPr>
+          <p:style>
+            <a:lnRef idx="3">
+              <a:schemeClr val="dk1"/>
+            </a:lnRef>
+            <a:fillRef idx="0">
+              <a:schemeClr val="dk1"/>
+            </a:fillRef>
+            <a:effectRef idx="2">
+              <a:schemeClr val="dk1"/>
+            </a:effectRef>
+            <a:fontRef idx="minor">
+              <a:schemeClr val="tx1"/>
+            </a:fontRef>
+          </p:style>
+        </p:cxnSp>
+      </p:grpSp>
+      <p:sp>
+        <p:nvSpPr>
+          <p:cNvPr id="26" name="TextBox 25">
+            <a:extLst>
+              <a:ext uri="{FF2B5EF4-FFF2-40B4-BE49-F238E27FC236}">
+                <a16:creationId xmlns:a16="http://schemas.microsoft.com/office/drawing/2014/main" id="{A20DDCEE-10BD-E740-80C6-6B5C44268BE0}"/>
+              </a:ext>
+            </a:extLst>
+          </p:cNvPr>
+          <p:cNvSpPr txBox="1"/>
+          <p:nvPr/>
+        </p:nvSpPr>
+        <p:spPr>
+          <a:xfrm>
+            <a:off x="3835182" y="2831402"/>
+            <a:ext cx="526106" cy="1015663"/>
+          </a:xfrm>
+          <a:prstGeom prst="rect">
+            <a:avLst/>
+          </a:prstGeom>
+          <a:noFill/>
+        </p:spPr>
+        <p:txBody>
+          <a:bodyPr wrap="none" rtlCol="0">
+            <a:spAutoFit/>
+          </a:bodyPr>
+          <a:lstStyle/>
+          <a:p>
+            <a:r>
+              <a:rPr lang="en-US" sz="6000" i="1" dirty="0">
+                <a:latin typeface="Times New Roman" panose="02020603050405020304" pitchFamily="18" charset="0"/>
+                <a:cs typeface="Times New Roman" panose="02020603050405020304" pitchFamily="18" charset="0"/>
+              </a:rPr>
+              <a:t>c</a:t>
+            </a:r>
+          </a:p>
+        </p:txBody>
+      </p:sp>
+      <p:cxnSp>
+        <p:nvCxnSpPr>
+          <p:cNvPr id="4" name="Straight Arrow Connector 3">
+            <a:extLst>
+              <a:ext uri="{FF2B5EF4-FFF2-40B4-BE49-F238E27FC236}">
+                <a16:creationId xmlns:a16="http://schemas.microsoft.com/office/drawing/2014/main" id="{EFE7F344-FE6F-094C-BCFC-F082C0879054}"/>
+              </a:ext>
+            </a:extLst>
+          </p:cNvPr>
+          <p:cNvCxnSpPr>
+            <a:cxnSpLocks/>
+          </p:cNvCxnSpPr>
+          <p:nvPr/>
+        </p:nvCxnSpPr>
+        <p:spPr>
+          <a:xfrm>
+            <a:off x="9147467" y="4618575"/>
+            <a:ext cx="2274512" cy="0"/>
+          </a:xfrm>
+          <a:prstGeom prst="straightConnector1">
+            <a:avLst/>
+          </a:prstGeom>
+          <a:ln w="47625">
+            <a:solidFill>
+              <a:srgbClr val="FF0000"/>
+            </a:solidFill>
+            <a:tailEnd type="triangle" w="lg" len="lg"/>
+          </a:ln>
+        </p:spPr>
+        <p:style>
+          <a:lnRef idx="1">
+            <a:schemeClr val="accent1"/>
+          </a:lnRef>
+          <a:fillRef idx="0">
+            <a:schemeClr val="accent1"/>
+          </a:fillRef>
+          <a:effectRef idx="0">
+            <a:schemeClr val="accent1"/>
+          </a:effectRef>
+          <a:fontRef idx="minor">
+            <a:schemeClr val="tx1"/>
+          </a:fontRef>
+        </p:style>
+      </p:cxnSp>
+    </p:spTree>
+    <p:extLst>
+      <p:ext uri="{BB962C8B-B14F-4D97-AF65-F5344CB8AC3E}">
+        <p14:creationId xmlns:p14="http://schemas.microsoft.com/office/powerpoint/2010/main" val="168740734"/>
+      </p:ext>
+    </p:extLst>
+  </p:cSld>
+  <p:clrMapOvr>
+    <a:masterClrMapping/>
+  </p:clrMapOvr>
+</p:sld>
+</file>
+
+<file path=ppt/slides/slide24.xml><?xml version="1.0" encoding="utf-8"?>
+<p:sld xmlns:a="http://schemas.openxmlformats.org/drawingml/2006/main" xmlns:r="http://schemas.openxmlformats.org/officeDocument/2006/relationships" xmlns:p="http://schemas.openxmlformats.org/presentationml/2006/main">
+  <p:cSld>
+    <p:spTree>
+      <p:nvGrpSpPr>
+        <p:cNvPr id="1" name=""/>
+        <p:cNvGrpSpPr/>
+        <p:nvPr/>
+      </p:nvGrpSpPr>
+      <p:grpSpPr>
+        <a:xfrm>
+          <a:off x="0" y="0"/>
+          <a:ext cx="0" cy="0"/>
+          <a:chOff x="0" y="0"/>
+          <a:chExt cx="0" cy="0"/>
+        </a:xfrm>
+      </p:grpSpPr>
+      <p:sp>
+        <p:nvSpPr>
+          <p:cNvPr id="5" name="Rectangle 4">
+            <a:extLst>
+              <a:ext uri="{FF2B5EF4-FFF2-40B4-BE49-F238E27FC236}">
+                <a16:creationId xmlns:a16="http://schemas.microsoft.com/office/drawing/2014/main" id="{523D8666-3C3F-F340-B973-E54232770241}"/>
+              </a:ext>
+            </a:extLst>
+          </p:cNvPr>
+          <p:cNvSpPr/>
+          <p:nvPr/>
+        </p:nvSpPr>
+        <p:spPr>
+          <a:xfrm>
+            <a:off x="0" y="1310640"/>
+            <a:ext cx="12192000" cy="5547360"/>
+          </a:xfrm>
+          <a:prstGeom prst="rect">
+            <a:avLst/>
+          </a:prstGeom>
+          <a:pattFill prst="wdDnDiag">
+            <a:fgClr>
+              <a:schemeClr val="accent3"/>
+            </a:fgClr>
+            <a:bgClr>
+              <a:schemeClr val="bg1"/>
+            </a:bgClr>
+          </a:pattFill>
+          <a:ln>
+            <a:solidFill>
+              <a:schemeClr val="bg1">
+                <a:lumMod val="75000"/>
+              </a:schemeClr>
+            </a:solidFill>
+          </a:ln>
+        </p:spPr>
+        <p:style>
+          <a:lnRef idx="2">
+            <a:schemeClr val="accent3">
+              <a:shade val="50000"/>
+            </a:schemeClr>
+          </a:lnRef>
+          <a:fillRef idx="1">
+            <a:schemeClr val="accent3"/>
+          </a:fillRef>
+          <a:effectRef idx="0">
+            <a:schemeClr val="accent3"/>
+          </a:effectRef>
+          <a:fontRef idx="minor">
+            <a:schemeClr val="lt1"/>
+          </a:fontRef>
+        </p:style>
+        <p:txBody>
+          <a:bodyPr rtlCol="0" anchor="ctr"/>
+          <a:lstStyle/>
+          <a:p>
+            <a:pPr algn="ctr"/>
+            <a:endParaRPr lang="en-US"/>
+          </a:p>
+        </p:txBody>
+      </p:sp>
+      <p:sp>
+        <p:nvSpPr>
+          <p:cNvPr id="8" name="Rectangle 7">
+            <a:extLst>
+              <a:ext uri="{FF2B5EF4-FFF2-40B4-BE49-F238E27FC236}">
+                <a16:creationId xmlns:a16="http://schemas.microsoft.com/office/drawing/2014/main" id="{AFC6364B-EF3D-4F42-9A61-8F064EA7267D}"/>
+              </a:ext>
+            </a:extLst>
+          </p:cNvPr>
+          <p:cNvSpPr/>
+          <p:nvPr/>
+        </p:nvSpPr>
+        <p:spPr>
+          <a:xfrm>
+            <a:off x="1173480" y="659474"/>
+            <a:ext cx="11209020" cy="5181600"/>
+          </a:xfrm>
+          <a:prstGeom prst="rect">
+            <a:avLst/>
+          </a:prstGeom>
+          <a:ln>
+            <a:noFill/>
+          </a:ln>
+        </p:spPr>
+        <p:style>
+          <a:lnRef idx="2">
+            <a:schemeClr val="accent6"/>
+          </a:lnRef>
+          <a:fillRef idx="1">
+            <a:schemeClr val="lt1"/>
+          </a:fillRef>
+          <a:effectRef idx="0">
+            <a:schemeClr val="accent6"/>
+          </a:effectRef>
+          <a:fontRef idx="minor">
+            <a:schemeClr val="dk1"/>
+          </a:fontRef>
+        </p:style>
+        <p:txBody>
+          <a:bodyPr rtlCol="0" anchor="ctr"/>
+          <a:lstStyle/>
+          <a:p>
+            <a:pPr algn="ctr"/>
+            <a:endParaRPr lang="en-US"/>
+          </a:p>
+        </p:txBody>
+      </p:sp>
+      <p:sp>
+        <p:nvSpPr>
+          <p:cNvPr id="6" name="Rectangle 5">
+            <a:extLst>
+              <a:ext uri="{FF2B5EF4-FFF2-40B4-BE49-F238E27FC236}">
+                <a16:creationId xmlns:a16="http://schemas.microsoft.com/office/drawing/2014/main" id="{D3E69269-CC87-E74A-B68F-E55DCB7ECD60}"/>
+              </a:ext>
+            </a:extLst>
+          </p:cNvPr>
+          <p:cNvSpPr/>
+          <p:nvPr/>
+        </p:nvSpPr>
+        <p:spPr>
+          <a:xfrm>
+            <a:off x="4849787" y="3401336"/>
+            <a:ext cx="4297680" cy="2434479"/>
+          </a:xfrm>
+          <a:prstGeom prst="rect">
+            <a:avLst/>
+          </a:prstGeom>
+          <a:solidFill>
+            <a:schemeClr val="bg1">
+              <a:lumMod val="85000"/>
+            </a:schemeClr>
+          </a:solidFill>
+          <a:ln w="38100">
+            <a:solidFill>
+              <a:schemeClr val="bg1">
+                <a:lumMod val="50000"/>
+              </a:schemeClr>
+            </a:solidFill>
+          </a:ln>
+        </p:spPr>
+        <p:style>
+          <a:lnRef idx="2">
+            <a:schemeClr val="accent3">
+              <a:shade val="50000"/>
+            </a:schemeClr>
+          </a:lnRef>
+          <a:fillRef idx="1">
+            <a:schemeClr val="accent3"/>
+          </a:fillRef>
+          <a:effectRef idx="0">
+            <a:schemeClr val="accent3"/>
+          </a:effectRef>
+          <a:fontRef idx="minor">
+            <a:schemeClr val="lt1"/>
+          </a:fontRef>
+        </p:style>
+        <p:txBody>
+          <a:bodyPr rtlCol="0" anchor="ctr"/>
+          <a:lstStyle/>
+          <a:p>
+            <a:pPr algn="ctr"/>
+            <a:r>
+              <a:rPr lang="en-US" sz="6000" i="1" dirty="0">
+                <a:solidFill>
+                  <a:schemeClr val="tx1"/>
+                </a:solidFill>
+                <a:latin typeface="Times New Roman" panose="02020603050405020304" pitchFamily="18" charset="0"/>
+                <a:cs typeface="Times New Roman" panose="02020603050405020304" pitchFamily="18" charset="0"/>
+              </a:rPr>
+              <a:t>m</a:t>
+            </a:r>
+          </a:p>
+        </p:txBody>
+      </p:sp>
+      <p:pic>
+        <p:nvPicPr>
+          <p:cNvPr id="9" name="Picture 8">
+            <a:extLst>
+              <a:ext uri="{FF2B5EF4-FFF2-40B4-BE49-F238E27FC236}">
+                <a16:creationId xmlns:a16="http://schemas.microsoft.com/office/drawing/2014/main" id="{547FDF70-C332-FF44-9E84-63DA969BAE52}"/>
+              </a:ext>
+            </a:extLst>
+          </p:cNvPr>
+          <p:cNvPicPr/>
+          <p:nvPr/>
+        </p:nvPicPr>
+        <p:blipFill rotWithShape="1">
+          <a:blip r:embed="rId2">
+            <a:extLst>
+              <a:ext uri="{BEBA8EAE-BF5A-486C-A8C5-ECC9F3942E4B}">
+                <a14:imgProps xmlns:a14="http://schemas.microsoft.com/office/drawing/2010/main">
+                  <a14:imgLayer r:embed="rId3">
+                    <a14:imgEffect>
+                      <a14:backgroundRemoval t="10000" b="90000" l="4750" r="96750"/>
+                    </a14:imgEffect>
+                  </a14:imgLayer>
+                </a14:imgProps>
+              </a:ext>
+              <a:ext uri="{28A0092B-C50C-407E-A947-70E740481C1C}">
+                <a14:useLocalDpi xmlns:a14="http://schemas.microsoft.com/office/drawing/2010/main" val="0"/>
+              </a:ext>
+            </a:extLst>
+          </a:blip>
+          <a:srcRect l="4622" r="4554"/>
+          <a:stretch/>
+        </p:blipFill>
+        <p:spPr bwMode="auto">
+          <a:xfrm>
+            <a:off x="1157438" y="4227035"/>
+            <a:ext cx="3676307" cy="856369"/>
+          </a:xfrm>
+          <a:prstGeom prst="rect">
+            <a:avLst/>
+          </a:prstGeom>
+          <a:noFill/>
+          <a:ln>
+            <a:noFill/>
+          </a:ln>
+        </p:spPr>
+      </p:pic>
+      <p:sp>
+        <p:nvSpPr>
+          <p:cNvPr id="11" name="TextBox 10">
+            <a:extLst>
+              <a:ext uri="{FF2B5EF4-FFF2-40B4-BE49-F238E27FC236}">
+                <a16:creationId xmlns:a16="http://schemas.microsoft.com/office/drawing/2014/main" id="{345B28EC-84B4-0144-951D-D1EC2BE6FC84}"/>
+              </a:ext>
+            </a:extLst>
+          </p:cNvPr>
+          <p:cNvSpPr txBox="1"/>
+          <p:nvPr/>
+        </p:nvSpPr>
+        <p:spPr>
+          <a:xfrm>
+            <a:off x="3857541" y="3719851"/>
+            <a:ext cx="526106" cy="1015663"/>
+          </a:xfrm>
+          <a:prstGeom prst="rect">
+            <a:avLst/>
+          </a:prstGeom>
+          <a:noFill/>
+        </p:spPr>
+        <p:txBody>
+          <a:bodyPr wrap="none" rtlCol="0">
+            <a:spAutoFit/>
+          </a:bodyPr>
+          <a:lstStyle/>
+          <a:p>
+            <a:r>
+              <a:rPr lang="en-US" sz="6000" i="1" dirty="0">
+                <a:latin typeface="Times New Roman" panose="02020603050405020304" pitchFamily="18" charset="0"/>
+                <a:cs typeface="Times New Roman" panose="02020603050405020304" pitchFamily="18" charset="0"/>
+              </a:rPr>
+              <a:t>k</a:t>
+            </a:r>
+          </a:p>
+        </p:txBody>
+      </p:sp>
+      <p:cxnSp>
+        <p:nvCxnSpPr>
+          <p:cNvPr id="13" name="Straight Connector 12">
+            <a:extLst>
+              <a:ext uri="{FF2B5EF4-FFF2-40B4-BE49-F238E27FC236}">
+                <a16:creationId xmlns:a16="http://schemas.microsoft.com/office/drawing/2014/main" id="{F3096D38-7AD8-0841-B0F8-27FB46B4CDCC}"/>
+              </a:ext>
+            </a:extLst>
+          </p:cNvPr>
+          <p:cNvCxnSpPr/>
+          <p:nvPr/>
+        </p:nvCxnSpPr>
+        <p:spPr>
+          <a:xfrm>
+            <a:off x="4849787" y="1397934"/>
+            <a:ext cx="0" cy="1702861"/>
+          </a:xfrm>
+          <a:prstGeom prst="line">
+            <a:avLst/>
+          </a:prstGeom>
+          <a:ln w="28575"/>
+        </p:spPr>
+        <p:style>
+          <a:lnRef idx="1">
+            <a:schemeClr val="dk1"/>
+          </a:lnRef>
+          <a:fillRef idx="0">
+            <a:schemeClr val="dk1"/>
+          </a:fillRef>
+          <a:effectRef idx="0">
+            <a:schemeClr val="dk1"/>
+          </a:effectRef>
+          <a:fontRef idx="minor">
+            <a:schemeClr val="tx1"/>
+          </a:fontRef>
+        </p:style>
+      </p:cxnSp>
+      <p:cxnSp>
+        <p:nvCxnSpPr>
+          <p:cNvPr id="15" name="Straight Arrow Connector 14">
+            <a:extLst>
+              <a:ext uri="{FF2B5EF4-FFF2-40B4-BE49-F238E27FC236}">
+                <a16:creationId xmlns:a16="http://schemas.microsoft.com/office/drawing/2014/main" id="{DCDEA662-F38C-B740-9BFB-E11210ACF556}"/>
+              </a:ext>
+            </a:extLst>
+          </p:cNvPr>
+          <p:cNvCxnSpPr/>
+          <p:nvPr/>
+        </p:nvCxnSpPr>
+        <p:spPr>
+          <a:xfrm>
+            <a:off x="4849787" y="2227741"/>
+            <a:ext cx="2148840" cy="0"/>
+          </a:xfrm>
+          <a:prstGeom prst="straightConnector1">
+            <a:avLst/>
+          </a:prstGeom>
+          <a:ln w="28575">
+            <a:tailEnd type="triangle" w="lg" len="lg"/>
+          </a:ln>
+        </p:spPr>
+        <p:style>
+          <a:lnRef idx="1">
+            <a:schemeClr val="dk1"/>
+          </a:lnRef>
+          <a:fillRef idx="0">
+            <a:schemeClr val="dk1"/>
+          </a:fillRef>
+          <a:effectRef idx="0">
+            <a:schemeClr val="dk1"/>
+          </a:effectRef>
+          <a:fontRef idx="minor">
+            <a:schemeClr val="tx1"/>
+          </a:fontRef>
+        </p:style>
+      </p:cxnSp>
+      <p:sp>
+        <p:nvSpPr>
+          <p:cNvPr id="16" name="TextBox 15">
+            <a:extLst>
+              <a:ext uri="{FF2B5EF4-FFF2-40B4-BE49-F238E27FC236}">
+                <a16:creationId xmlns:a16="http://schemas.microsoft.com/office/drawing/2014/main" id="{A096C57D-7003-0E45-89F6-0758B5E07156}"/>
+              </a:ext>
+            </a:extLst>
+          </p:cNvPr>
+          <p:cNvSpPr txBox="1"/>
+          <p:nvPr/>
+        </p:nvSpPr>
+        <p:spPr>
+          <a:xfrm>
+            <a:off x="5661154" y="1140774"/>
+            <a:ext cx="526106" cy="1015663"/>
+          </a:xfrm>
+          <a:prstGeom prst="rect">
+            <a:avLst/>
+          </a:prstGeom>
+          <a:noFill/>
+        </p:spPr>
+        <p:txBody>
+          <a:bodyPr wrap="none" rtlCol="0">
+            <a:spAutoFit/>
+          </a:bodyPr>
+          <a:lstStyle/>
+          <a:p>
+            <a:r>
+              <a:rPr lang="en-US" sz="6000" i="1" dirty="0">
+                <a:latin typeface="Times New Roman" panose="02020603050405020304" pitchFamily="18" charset="0"/>
+                <a:cs typeface="Times New Roman" panose="02020603050405020304" pitchFamily="18" charset="0"/>
+              </a:rPr>
+              <a:t>x</a:t>
+            </a:r>
+          </a:p>
+        </p:txBody>
+      </p:sp>
+      <p:cxnSp>
+        <p:nvCxnSpPr>
+          <p:cNvPr id="17" name="Straight Arrow Connector 16">
+            <a:extLst>
+              <a:ext uri="{FF2B5EF4-FFF2-40B4-BE49-F238E27FC236}">
+                <a16:creationId xmlns:a16="http://schemas.microsoft.com/office/drawing/2014/main" id="{1AEFBAD7-8963-1642-B72E-277D4C26D88E}"/>
+              </a:ext>
+            </a:extLst>
+          </p:cNvPr>
+          <p:cNvCxnSpPr>
+            <a:cxnSpLocks/>
+          </p:cNvCxnSpPr>
+          <p:nvPr/>
+        </p:nvCxnSpPr>
+        <p:spPr>
+          <a:xfrm>
+            <a:off x="1173480" y="2225040"/>
+            <a:ext cx="3676307" cy="0"/>
+          </a:xfrm>
+          <a:prstGeom prst="straightConnector1">
+            <a:avLst/>
+          </a:prstGeom>
+          <a:ln w="28575">
+            <a:headEnd type="triangle" w="lg" len="lg"/>
+            <a:tailEnd type="triangle" w="lg" len="lg"/>
+          </a:ln>
+        </p:spPr>
+        <p:style>
+          <a:lnRef idx="1">
+            <a:schemeClr val="dk1"/>
+          </a:lnRef>
+          <a:fillRef idx="0">
+            <a:schemeClr val="dk1"/>
+          </a:fillRef>
+          <a:effectRef idx="0">
+            <a:schemeClr val="dk1"/>
+          </a:effectRef>
+          <a:fontRef idx="minor">
+            <a:schemeClr val="tx1"/>
+          </a:fontRef>
+        </p:style>
+      </p:cxnSp>
+      <p:sp>
+        <p:nvSpPr>
+          <p:cNvPr id="19" name="TextBox 18">
+            <a:extLst>
+              <a:ext uri="{FF2B5EF4-FFF2-40B4-BE49-F238E27FC236}">
+                <a16:creationId xmlns:a16="http://schemas.microsoft.com/office/drawing/2014/main" id="{08BD4514-0631-2849-93C9-97BEFDBB3CAB}"/>
+              </a:ext>
+            </a:extLst>
+          </p:cNvPr>
+          <p:cNvSpPr txBox="1"/>
+          <p:nvPr/>
+        </p:nvSpPr>
+        <p:spPr>
+          <a:xfrm>
+            <a:off x="2639861" y="1048745"/>
+            <a:ext cx="1010213" cy="1015663"/>
+          </a:xfrm>
+          <a:prstGeom prst="rect">
+            <a:avLst/>
+          </a:prstGeom>
+          <a:noFill/>
+        </p:spPr>
+        <p:txBody>
+          <a:bodyPr wrap="none" rtlCol="0">
+            <a:spAutoFit/>
+          </a:bodyPr>
+          <a:lstStyle/>
+          <a:p>
+            <a:r>
+              <a:rPr lang="en-US" sz="6000" i="1" dirty="0" err="1">
+                <a:latin typeface="Times New Roman" panose="02020603050405020304" pitchFamily="18" charset="0"/>
+                <a:cs typeface="Times New Roman" panose="02020603050405020304" pitchFamily="18" charset="0"/>
+              </a:rPr>
+              <a:t>x</a:t>
+            </a:r>
+            <a:r>
+              <a:rPr lang="en-US" sz="6000" i="1" baseline="-25000" dirty="0" err="1">
+                <a:latin typeface="Times New Roman" panose="02020603050405020304" pitchFamily="18" charset="0"/>
+                <a:cs typeface="Times New Roman" panose="02020603050405020304" pitchFamily="18" charset="0"/>
+              </a:rPr>
+              <a:t>eq</a:t>
+            </a:r>
+            <a:endParaRPr lang="en-US" sz="6000" i="1" baseline="-25000" dirty="0">
+              <a:latin typeface="Times New Roman" panose="02020603050405020304" pitchFamily="18" charset="0"/>
+              <a:cs typeface="Times New Roman" panose="02020603050405020304" pitchFamily="18" charset="0"/>
+            </a:endParaRPr>
+          </a:p>
+        </p:txBody>
+      </p:sp>
+      <p:sp>
+        <p:nvSpPr>
+          <p:cNvPr id="20" name="TextBox 19">
+            <a:extLst>
+              <a:ext uri="{FF2B5EF4-FFF2-40B4-BE49-F238E27FC236}">
+                <a16:creationId xmlns:a16="http://schemas.microsoft.com/office/drawing/2014/main" id="{DD5E0161-A828-1B43-9EC2-E4CBBE1C8B0A}"/>
+              </a:ext>
+            </a:extLst>
+          </p:cNvPr>
+          <p:cNvSpPr txBox="1"/>
+          <p:nvPr/>
+        </p:nvSpPr>
+        <p:spPr>
+          <a:xfrm>
+            <a:off x="9956568" y="3517979"/>
+            <a:ext cx="654346" cy="1015663"/>
+          </a:xfrm>
+          <a:prstGeom prst="rect">
+            <a:avLst/>
+          </a:prstGeom>
+          <a:noFill/>
+        </p:spPr>
+        <p:txBody>
+          <a:bodyPr wrap="none" rtlCol="0">
+            <a:spAutoFit/>
+          </a:bodyPr>
+          <a:lstStyle/>
+          <a:p>
+            <a:r>
+              <a:rPr lang="en-US" sz="6000" i="1" dirty="0">
+                <a:latin typeface="Times New Roman" panose="02020603050405020304" pitchFamily="18" charset="0"/>
+                <a:cs typeface="Times New Roman" panose="02020603050405020304" pitchFamily="18" charset="0"/>
+              </a:rPr>
+              <a:t>F</a:t>
+            </a:r>
+            <a:endParaRPr lang="en-US" sz="6000" dirty="0">
+              <a:latin typeface="Times New Roman" panose="02020603050405020304" pitchFamily="18" charset="0"/>
+              <a:cs typeface="Times New Roman" panose="02020603050405020304" pitchFamily="18" charset="0"/>
+            </a:endParaRPr>
+          </a:p>
+        </p:txBody>
+      </p:sp>
+      <p:cxnSp>
+        <p:nvCxnSpPr>
+          <p:cNvPr id="4" name="Straight Arrow Connector 3">
+            <a:extLst>
+              <a:ext uri="{FF2B5EF4-FFF2-40B4-BE49-F238E27FC236}">
+                <a16:creationId xmlns:a16="http://schemas.microsoft.com/office/drawing/2014/main" id="{EFE7F344-FE6F-094C-BCFC-F082C0879054}"/>
+              </a:ext>
+            </a:extLst>
+          </p:cNvPr>
+          <p:cNvCxnSpPr>
+            <a:cxnSpLocks/>
+          </p:cNvCxnSpPr>
+          <p:nvPr/>
+        </p:nvCxnSpPr>
+        <p:spPr>
+          <a:xfrm>
+            <a:off x="9147467" y="4618575"/>
+            <a:ext cx="2274512" cy="0"/>
+          </a:xfrm>
+          <a:prstGeom prst="straightConnector1">
+            <a:avLst/>
+          </a:prstGeom>
+          <a:ln w="47625">
+            <a:solidFill>
+              <a:srgbClr val="FF0000"/>
+            </a:solidFill>
+            <a:tailEnd type="triangle" w="lg" len="lg"/>
+          </a:ln>
+        </p:spPr>
+        <p:style>
+          <a:lnRef idx="1">
+            <a:schemeClr val="accent1"/>
+          </a:lnRef>
+          <a:fillRef idx="0">
+            <a:schemeClr val="accent1"/>
+          </a:fillRef>
+          <a:effectRef idx="0">
+            <a:schemeClr val="accent1"/>
+          </a:effectRef>
+          <a:fontRef idx="minor">
+            <a:schemeClr val="tx1"/>
+          </a:fontRef>
+        </p:style>
+      </p:cxnSp>
+    </p:spTree>
+    <p:extLst>
+      <p:ext uri="{BB962C8B-B14F-4D97-AF65-F5344CB8AC3E}">
+        <p14:creationId xmlns:p14="http://schemas.microsoft.com/office/powerpoint/2010/main" val="4112320941"/>
       </p:ext>
     </p:extLst>
   </p:cSld>
@@ -50861,8 +52358,8 @@
           </a:fontRef>
         </p:style>
       </p:cxnSp>
-      <mc:AlternateContent xmlns:mc="http://schemas.openxmlformats.org/markup-compatibility/2006">
-        <mc:Choice xmlns:a14="http://schemas.microsoft.com/office/drawing/2010/main" Requires="a14">
+      <mc:AlternateContent xmlns:mc="http://schemas.openxmlformats.org/markup-compatibility/2006" xmlns:a14="http://schemas.microsoft.com/office/drawing/2010/main">
+        <mc:Choice Requires="a14">
           <p:sp>
             <p:nvSpPr>
               <p:cNvPr id="22" name="TextBox 21">
@@ -50891,6 +52388,7 @@
               </a:bodyPr>
               <a:lstStyle/>
               <a:p>
+                <a:pPr/>
                 <a14:m>
                   <m:oMathPara xmlns:m="http://schemas.openxmlformats.org/officeDocument/2006/math">
                     <m:oMathParaPr>
@@ -50912,7 +52410,7 @@
             </p:txBody>
           </p:sp>
         </mc:Choice>
-        <mc:Fallback>
+        <mc:Fallback xmlns="">
           <p:sp>
             <p:nvSpPr>
               <p:cNvPr id="22" name="TextBox 21">
@@ -50957,8 +52455,8 @@
           </p:sp>
         </mc:Fallback>
       </mc:AlternateContent>
-      <mc:AlternateContent xmlns:mc="http://schemas.openxmlformats.org/markup-compatibility/2006">
-        <mc:Choice xmlns:a14="http://schemas.microsoft.com/office/drawing/2010/main" Requires="a14">
+      <mc:AlternateContent xmlns:mc="http://schemas.openxmlformats.org/markup-compatibility/2006" xmlns:a14="http://schemas.microsoft.com/office/drawing/2010/main">
+        <mc:Choice Requires="a14">
           <p:sp>
             <p:nvSpPr>
               <p:cNvPr id="23" name="TextBox 22">
@@ -50987,6 +52485,7 @@
               </a:bodyPr>
               <a:lstStyle/>
               <a:p>
+                <a:pPr/>
                 <a14:m>
                   <m:oMathPara xmlns:m="http://schemas.openxmlformats.org/officeDocument/2006/math">
                     <m:oMathParaPr>
@@ -51040,7 +52539,7 @@
             </p:txBody>
           </p:sp>
         </mc:Choice>
-        <mc:Fallback>
+        <mc:Fallback xmlns="">
           <p:sp>
             <p:nvSpPr>
               <p:cNvPr id="23" name="TextBox 22">
@@ -51366,8 +52865,8 @@
           </a:fontRef>
         </p:style>
       </p:cxnSp>
-      <mc:AlternateContent xmlns:mc="http://schemas.openxmlformats.org/markup-compatibility/2006">
-        <mc:Choice xmlns:a14="http://schemas.microsoft.com/office/drawing/2010/main" Requires="a14">
+      <mc:AlternateContent xmlns:mc="http://schemas.openxmlformats.org/markup-compatibility/2006" xmlns:a14="http://schemas.microsoft.com/office/drawing/2010/main">
+        <mc:Choice Requires="a14">
           <p:sp>
             <p:nvSpPr>
               <p:cNvPr id="39" name="TextBox 38">
@@ -51484,7 +52983,7 @@
             </p:txBody>
           </p:sp>
         </mc:Choice>
-        <mc:Fallback>
+        <mc:Fallback xmlns="">
           <p:sp>
             <p:nvSpPr>
               <p:cNvPr id="39" name="TextBox 38">
@@ -51529,8 +53028,8 @@
           </p:sp>
         </mc:Fallback>
       </mc:AlternateContent>
-      <mc:AlternateContent xmlns:mc="http://schemas.openxmlformats.org/markup-compatibility/2006">
-        <mc:Choice xmlns:a14="http://schemas.microsoft.com/office/drawing/2010/main" Requires="a14">
+      <mc:AlternateContent xmlns:mc="http://schemas.openxmlformats.org/markup-compatibility/2006" xmlns:a14="http://schemas.microsoft.com/office/drawing/2010/main">
+        <mc:Choice Requires="a14">
           <p:sp>
             <p:nvSpPr>
               <p:cNvPr id="40" name="TextBox 39">
@@ -51596,7 +53095,7 @@
             </p:txBody>
           </p:sp>
         </mc:Choice>
-        <mc:Fallback>
+        <mc:Fallback xmlns="">
           <p:sp>
             <p:nvSpPr>
               <p:cNvPr id="40" name="TextBox 39">

</xml_diff>